<commit_message>
updated language trade study slides
</commit_message>
<xml_diff>
--- a/presentations/LanguageStudy.pptx
+++ b/presentations/LanguageStudy.pptx
@@ -26,14 +26,14 @@
     <p:sldId id="273" r:id="rId20"/>
     <p:sldId id="275" r:id="rId21"/>
     <p:sldId id="274" r:id="rId22"/>
-    <p:sldId id="278" r:id="rId23"/>
-    <p:sldId id="276" r:id="rId24"/>
-    <p:sldId id="277" r:id="rId25"/>
-    <p:sldId id="279" r:id="rId26"/>
-    <p:sldId id="289" r:id="rId27"/>
-    <p:sldId id="290" r:id="rId28"/>
-    <p:sldId id="291" r:id="rId29"/>
-    <p:sldId id="292" r:id="rId30"/>
+    <p:sldId id="294" r:id="rId23"/>
+    <p:sldId id="295" r:id="rId24"/>
+    <p:sldId id="296" r:id="rId25"/>
+    <p:sldId id="278" r:id="rId26"/>
+    <p:sldId id="276" r:id="rId27"/>
+    <p:sldId id="277" r:id="rId28"/>
+    <p:sldId id="279" r:id="rId29"/>
+    <p:sldId id="289" r:id="rId30"/>
     <p:sldId id="280" r:id="rId31"/>
     <p:sldId id="288" r:id="rId32"/>
     <p:sldId id="282" r:id="rId33"/>
@@ -288,11 +288,11 @@
           <c:showBubbleSize val="0"/>
         </c:dLbls>
         <c:gapWidth val="150"/>
-        <c:axId val="-2036526856"/>
-        <c:axId val="2146774936"/>
+        <c:axId val="-2033632488"/>
+        <c:axId val="2145457992"/>
       </c:barChart>
       <c:catAx>
-        <c:axId val="-2036526856"/>
+        <c:axId val="-2033632488"/>
         <c:scaling>
           <c:orientation val="minMax"/>
         </c:scaling>
@@ -301,7 +301,7 @@
         <c:majorTickMark val="out"/>
         <c:minorTickMark val="none"/>
         <c:tickLblPos val="nextTo"/>
-        <c:crossAx val="2146774936"/>
+        <c:crossAx val="2145457992"/>
         <c:crosses val="autoZero"/>
         <c:auto val="1"/>
         <c:lblAlgn val="ctr"/>
@@ -309,7 +309,7 @@
         <c:noMultiLvlLbl val="0"/>
       </c:catAx>
       <c:valAx>
-        <c:axId val="2146774936"/>
+        <c:axId val="2145457992"/>
         <c:scaling>
           <c:orientation val="minMax"/>
         </c:scaling>
@@ -320,7 +320,7 @@
         <c:majorTickMark val="out"/>
         <c:minorTickMark val="none"/>
         <c:tickLblPos val="nextTo"/>
-        <c:crossAx val="-2036526856"/>
+        <c:crossAx val="-2033632488"/>
         <c:crosses val="autoZero"/>
         <c:crossBetween val="between"/>
       </c:valAx>
@@ -561,7 +561,7 @@
           <a:p>
             <a:fld id="{651A0C47-018D-4460-B945-BFF7981B6CA6}" type="datetimeFigureOut">
               <a:rPr lang="en-US" smtClean="0"/>
-              <a:t>2/5/16</a:t>
+              <a:t>2/6/16</a:t>
             </a:fld>
             <a:endParaRPr lang="en-US"/>
           </a:p>
@@ -893,7 +893,7 @@
           <a:p>
             <a:fld id="{651A0C47-018D-4460-B945-BFF7981B6CA6}" type="datetimeFigureOut">
               <a:rPr lang="en-US" smtClean="0"/>
-              <a:t>2/5/16</a:t>
+              <a:t>2/6/16</a:t>
             </a:fld>
             <a:endParaRPr lang="en-US"/>
           </a:p>
@@ -1225,7 +1225,7 @@
           <a:p>
             <a:fld id="{651A0C47-018D-4460-B945-BFF7981B6CA6}" type="datetimeFigureOut">
               <a:rPr lang="en-US" smtClean="0"/>
-              <a:t>2/5/16</a:t>
+              <a:t>2/6/16</a:t>
             </a:fld>
             <a:endParaRPr lang="en-US"/>
           </a:p>
@@ -1557,7 +1557,7 @@
           <a:p>
             <a:fld id="{651A0C47-018D-4460-B945-BFF7981B6CA6}" type="datetimeFigureOut">
               <a:rPr lang="en-US" smtClean="0"/>
-              <a:t>2/5/16</a:t>
+              <a:t>2/6/16</a:t>
             </a:fld>
             <a:endParaRPr lang="en-US"/>
           </a:p>
@@ -2246,7 +2246,7 @@
           <a:p>
             <a:fld id="{651A0C47-018D-4460-B945-BFF7981B6CA6}" type="datetimeFigureOut">
               <a:rPr lang="en-US" smtClean="0"/>
-              <a:t>2/5/16</a:t>
+              <a:t>2/6/16</a:t>
             </a:fld>
             <a:endParaRPr lang="en-US"/>
           </a:p>
@@ -2425,7 +2425,7 @@
           <a:p>
             <a:fld id="{651A0C47-018D-4460-B945-BFF7981B6CA6}" type="datetimeFigureOut">
               <a:rPr lang="en-US" smtClean="0"/>
-              <a:t>2/5/16</a:t>
+              <a:t>2/6/16</a:t>
             </a:fld>
             <a:endParaRPr lang="en-US"/>
           </a:p>
@@ -2599,7 +2599,7 @@
           <a:p>
             <a:fld id="{651A0C47-018D-4460-B945-BFF7981B6CA6}" type="datetimeFigureOut">
               <a:rPr lang="en-US" smtClean="0"/>
-              <a:t>2/5/16</a:t>
+              <a:t>2/6/16</a:t>
             </a:fld>
             <a:endParaRPr lang="en-US"/>
           </a:p>
@@ -2847,7 +2847,7 @@
           <a:p>
             <a:fld id="{651A0C47-018D-4460-B945-BFF7981B6CA6}" type="datetimeFigureOut">
               <a:rPr lang="en-US" smtClean="0"/>
-              <a:t>2/5/16</a:t>
+              <a:t>2/6/16</a:t>
             </a:fld>
             <a:endParaRPr lang="en-US"/>
           </a:p>
@@ -3177,7 +3177,7 @@
           <a:p>
             <a:fld id="{651A0C47-018D-4460-B945-BFF7981B6CA6}" type="datetimeFigureOut">
               <a:rPr lang="en-US" smtClean="0"/>
-              <a:t>2/5/16</a:t>
+              <a:t>2/6/16</a:t>
             </a:fld>
             <a:endParaRPr lang="en-US"/>
           </a:p>
@@ -3469,7 +3469,7 @@
           <a:p>
             <a:fld id="{651A0C47-018D-4460-B945-BFF7981B6CA6}" type="datetimeFigureOut">
               <a:rPr lang="en-US" smtClean="0"/>
-              <a:t>2/5/16</a:t>
+              <a:t>2/6/16</a:t>
             </a:fld>
             <a:endParaRPr lang="en-US"/>
           </a:p>
@@ -3905,7 +3905,7 @@
           <a:p>
             <a:fld id="{651A0C47-018D-4460-B945-BFF7981B6CA6}" type="datetimeFigureOut">
               <a:rPr lang="en-US" smtClean="0"/>
-              <a:t>2/5/16</a:t>
+              <a:t>2/6/16</a:t>
             </a:fld>
             <a:endParaRPr lang="en-US"/>
           </a:p>
@@ -4092,7 +4092,7 @@
           <a:p>
             <a:fld id="{651A0C47-018D-4460-B945-BFF7981B6CA6}" type="datetimeFigureOut">
               <a:rPr lang="en-US" smtClean="0"/>
-              <a:t>2/5/16</a:t>
+              <a:t>2/6/16</a:t>
             </a:fld>
             <a:endParaRPr lang="en-US"/>
           </a:p>
@@ -4182,7 +4182,7 @@
           <a:p>
             <a:fld id="{651A0C47-018D-4460-B945-BFF7981B6CA6}" type="datetimeFigureOut">
               <a:rPr lang="en-US" smtClean="0"/>
-              <a:t>2/5/16</a:t>
+              <a:t>2/6/16</a:t>
             </a:fld>
             <a:endParaRPr lang="en-US"/>
           </a:p>
@@ -4463,7 +4463,7 @@
           <a:p>
             <a:fld id="{651A0C47-018D-4460-B945-BFF7981B6CA6}" type="datetimeFigureOut">
               <a:rPr lang="en-US" smtClean="0"/>
-              <a:t>2/5/16</a:t>
+              <a:t>2/6/16</a:t>
             </a:fld>
             <a:endParaRPr lang="en-US"/>
           </a:p>
@@ -4678,7 +4678,7 @@
           <a:p>
             <a:fld id="{651A0C47-018D-4460-B945-BFF7981B6CA6}" type="datetimeFigureOut">
               <a:rPr lang="en-US" smtClean="0"/>
-              <a:t>2/5/16</a:t>
+              <a:t>2/6/16</a:t>
             </a:fld>
             <a:endParaRPr lang="en-US"/>
           </a:p>
@@ -5496,8 +5496,8 @@
         </p:nvSpPr>
         <p:spPr>
           <a:xfrm>
-            <a:off x="2286000" y="667382"/>
-            <a:ext cx="4572000" cy="5078314"/>
+            <a:off x="2288089" y="314079"/>
+            <a:ext cx="4572000" cy="4524316"/>
           </a:xfrm>
           <a:prstGeom prst="rect">
             <a:avLst/>
@@ -5510,294 +5510,294 @@
           <a:lstStyle/>
           <a:p>
             <a:r>
-              <a:rPr lang="en-US" dirty="0"/>
+              <a:rPr lang="en-US" sz="1600" dirty="0"/>
               <a:t>;; object references:</a:t>
             </a:r>
           </a:p>
           <a:p>
-            <a:endParaRPr lang="en-US" dirty="0"/>
-          </a:p>
-          <a:p>
-            <a:r>
-              <a:rPr lang="en-US" dirty="0"/>
+            <a:endParaRPr lang="en-US" sz="1600" dirty="0"/>
+          </a:p>
+          <a:p>
+            <a:r>
+              <a:rPr lang="en-US" sz="1600" dirty="0"/>
               <a:t>(define-sort </a:t>
             </a:r>
             <a:r>
-              <a:rPr lang="en-US" dirty="0" err="1"/>
+              <a:rPr lang="en-US" sz="1600" dirty="0" err="1"/>
               <a:t>Obj</a:t>
             </a:r>
             <a:r>
-              <a:rPr lang="en-US" dirty="0"/>
+              <a:rPr lang="en-US" sz="1600" dirty="0"/>
               <a:t> () </a:t>
             </a:r>
             <a:r>
-              <a:rPr lang="en-US" dirty="0" err="1"/>
+              <a:rPr lang="en-US" sz="1600" dirty="0" err="1"/>
               <a:t>Int</a:t>
             </a:r>
             <a:r>
-              <a:rPr lang="en-US" dirty="0"/>
+              <a:rPr lang="en-US" sz="1600" dirty="0"/>
               <a:t>)</a:t>
             </a:r>
           </a:p>
           <a:p>
-            <a:endParaRPr lang="en-US" dirty="0"/>
-          </a:p>
-          <a:p>
-            <a:r>
-              <a:rPr lang="en-US" dirty="0"/>
+            <a:endParaRPr lang="en-US" sz="1600" dirty="0"/>
+          </a:p>
+          <a:p>
+            <a:r>
+              <a:rPr lang="en-US" sz="1600" dirty="0"/>
               <a:t>;; class Book:</a:t>
             </a:r>
           </a:p>
           <a:p>
-            <a:endParaRPr lang="en-US" dirty="0"/>
-          </a:p>
-          <a:p>
-            <a:r>
-              <a:rPr lang="en-US" dirty="0"/>
+            <a:endParaRPr lang="en-US" sz="1600" dirty="0"/>
+          </a:p>
+          <a:p>
+            <a:r>
+              <a:rPr lang="en-US" sz="1600" dirty="0"/>
               <a:t>(declare-fun Book (</a:t>
             </a:r>
             <a:r>
-              <a:rPr lang="en-US" dirty="0" err="1"/>
+              <a:rPr lang="en-US" sz="1600" dirty="0" err="1"/>
               <a:t>Obj</a:t>
             </a:r>
             <a:r>
-              <a:rPr lang="en-US" dirty="0"/>
+              <a:rPr lang="en-US" sz="1600" dirty="0"/>
               <a:t>) </a:t>
             </a:r>
             <a:r>
-              <a:rPr lang="en-US" dirty="0" err="1"/>
+              <a:rPr lang="en-US" sz="1600" dirty="0" err="1"/>
               <a:t>Bool</a:t>
             </a:r>
             <a:r>
-              <a:rPr lang="en-US" dirty="0"/>
+              <a:rPr lang="en-US" sz="1600" dirty="0"/>
               <a:t>)</a:t>
             </a:r>
           </a:p>
           <a:p>
             <a:r>
-              <a:rPr lang="en-US" dirty="0"/>
+              <a:rPr lang="en-US" sz="1600" dirty="0"/>
               <a:t>(declare-fun </a:t>
             </a:r>
             <a:r>
-              <a:rPr lang="en-US" dirty="0" err="1"/>
+              <a:rPr lang="en-US" sz="1600" dirty="0" err="1"/>
               <a:t>Book.pages</a:t>
             </a:r>
             <a:r>
-              <a:rPr lang="en-US" dirty="0"/>
+              <a:rPr lang="en-US" sz="1600" dirty="0"/>
               <a:t> (</a:t>
             </a:r>
             <a:r>
-              <a:rPr lang="en-US" dirty="0" err="1"/>
+              <a:rPr lang="en-US" sz="1600" dirty="0" err="1"/>
               <a:t>Obj</a:t>
             </a:r>
             <a:r>
-              <a:rPr lang="en-US" dirty="0"/>
+              <a:rPr lang="en-US" sz="1600" dirty="0"/>
               <a:t>) </a:t>
             </a:r>
             <a:r>
-              <a:rPr lang="en-US" dirty="0" err="1"/>
+              <a:rPr lang="en-US" sz="1600" dirty="0" err="1"/>
               <a:t>Int</a:t>
             </a:r>
             <a:r>
-              <a:rPr lang="en-US" dirty="0"/>
+              <a:rPr lang="en-US" sz="1600" dirty="0"/>
               <a:t>)</a:t>
             </a:r>
           </a:p>
           <a:p>
             <a:r>
-              <a:rPr lang="en-US" dirty="0"/>
+              <a:rPr lang="en-US" sz="1600" dirty="0"/>
               <a:t>(declare-fun </a:t>
             </a:r>
             <a:r>
-              <a:rPr lang="en-US" dirty="0" err="1"/>
+              <a:rPr lang="en-US" sz="1600" dirty="0" err="1"/>
               <a:t>Book.isbn</a:t>
             </a:r>
             <a:r>
-              <a:rPr lang="en-US" dirty="0"/>
+              <a:rPr lang="en-US" sz="1600" dirty="0"/>
               <a:t> (</a:t>
             </a:r>
             <a:r>
-              <a:rPr lang="en-US" dirty="0" err="1"/>
+              <a:rPr lang="en-US" sz="1600" dirty="0" err="1"/>
               <a:t>Obj</a:t>
             </a:r>
             <a:r>
-              <a:rPr lang="en-US" dirty="0"/>
+              <a:rPr lang="en-US" sz="1600" dirty="0"/>
               <a:t>) </a:t>
             </a:r>
             <a:r>
-              <a:rPr lang="en-US" dirty="0" err="1"/>
+              <a:rPr lang="en-US" sz="1600" dirty="0" err="1"/>
               <a:t>Int</a:t>
             </a:r>
             <a:r>
-              <a:rPr lang="en-US" dirty="0"/>
+              <a:rPr lang="en-US" sz="1600" dirty="0"/>
               <a:t>)</a:t>
             </a:r>
           </a:p>
           <a:p>
             <a:r>
-              <a:rPr lang="en-US" dirty="0"/>
+              <a:rPr lang="en-US" sz="1600" dirty="0"/>
               <a:t>(declare-fun </a:t>
             </a:r>
             <a:r>
-              <a:rPr lang="en-US" dirty="0" err="1"/>
+              <a:rPr lang="en-US" sz="1600" dirty="0" err="1"/>
               <a:t>Book.authors</a:t>
             </a:r>
             <a:r>
-              <a:rPr lang="en-US" dirty="0"/>
+              <a:rPr lang="en-US" sz="1600" dirty="0"/>
               <a:t> (</a:t>
             </a:r>
             <a:r>
-              <a:rPr lang="en-US" dirty="0" err="1"/>
+              <a:rPr lang="en-US" sz="1600" dirty="0" err="1"/>
               <a:t>Obj</a:t>
             </a:r>
             <a:r>
-              <a:rPr lang="en-US" dirty="0"/>
+              <a:rPr lang="en-US" sz="1600" dirty="0"/>
               <a:t> </a:t>
             </a:r>
             <a:r>
-              <a:rPr lang="en-US" dirty="0" err="1"/>
+              <a:rPr lang="en-US" sz="1600" dirty="0" err="1"/>
               <a:t>Obj</a:t>
             </a:r>
             <a:r>
-              <a:rPr lang="en-US" dirty="0"/>
+              <a:rPr lang="en-US" sz="1600" dirty="0"/>
               <a:t>) </a:t>
             </a:r>
             <a:r>
-              <a:rPr lang="en-US" dirty="0" err="1"/>
+              <a:rPr lang="en-US" sz="1600" dirty="0" err="1"/>
               <a:t>Bool</a:t>
             </a:r>
             <a:r>
-              <a:rPr lang="en-US" dirty="0"/>
+              <a:rPr lang="en-US" sz="1600" dirty="0"/>
               <a:t>)</a:t>
             </a:r>
           </a:p>
           <a:p>
             <a:r>
-              <a:rPr lang="en-US" dirty="0"/>
+              <a:rPr lang="en-US" sz="1600" dirty="0"/>
               <a:t>(assert (exists ((self </a:t>
             </a:r>
             <a:r>
-              <a:rPr lang="en-US" dirty="0" err="1"/>
+              <a:rPr lang="en-US" sz="1600" dirty="0" err="1"/>
               <a:t>Obj</a:t>
             </a:r>
             <a:r>
-              <a:rPr lang="en-US" dirty="0"/>
+              <a:rPr lang="en-US" sz="1600" dirty="0"/>
               <a:t>)) (Book self)))</a:t>
             </a:r>
           </a:p>
           <a:p>
-            <a:endParaRPr lang="en-US" dirty="0"/>
-          </a:p>
-          <a:p>
-            <a:r>
-              <a:rPr lang="en-US" dirty="0"/>
+            <a:endParaRPr lang="en-US" sz="1600" dirty="0"/>
+          </a:p>
+          <a:p>
+            <a:r>
+              <a:rPr lang="en-US" sz="1600" dirty="0"/>
               <a:t>;; class Author:</a:t>
             </a:r>
           </a:p>
           <a:p>
-            <a:endParaRPr lang="en-US" dirty="0"/>
-          </a:p>
-          <a:p>
-            <a:r>
-              <a:rPr lang="en-US" dirty="0"/>
+            <a:endParaRPr lang="en-US" sz="1600" dirty="0"/>
+          </a:p>
+          <a:p>
+            <a:r>
+              <a:rPr lang="en-US" sz="1600" dirty="0"/>
               <a:t>(declare-fun Author (</a:t>
             </a:r>
             <a:r>
-              <a:rPr lang="en-US" dirty="0" err="1"/>
+              <a:rPr lang="en-US" sz="1600" dirty="0" err="1"/>
               <a:t>Obj</a:t>
             </a:r>
             <a:r>
-              <a:rPr lang="en-US" dirty="0"/>
+              <a:rPr lang="en-US" sz="1600" dirty="0"/>
               <a:t>) </a:t>
             </a:r>
             <a:r>
-              <a:rPr lang="en-US" dirty="0" err="1"/>
+              <a:rPr lang="en-US" sz="1600" dirty="0" err="1"/>
               <a:t>Bool</a:t>
             </a:r>
             <a:r>
-              <a:rPr lang="en-US" dirty="0"/>
+              <a:rPr lang="en-US" sz="1600" dirty="0"/>
               <a:t>)</a:t>
             </a:r>
           </a:p>
           <a:p>
             <a:r>
-              <a:rPr lang="en-US" dirty="0"/>
+              <a:rPr lang="en-US" sz="1600" dirty="0"/>
               <a:t>(declare-fun </a:t>
             </a:r>
             <a:r>
-              <a:rPr lang="en-US" dirty="0" err="1"/>
+              <a:rPr lang="en-US" sz="1600" dirty="0" err="1"/>
               <a:t>Author.approved</a:t>
             </a:r>
             <a:r>
-              <a:rPr lang="en-US" dirty="0"/>
+              <a:rPr lang="en-US" sz="1600" dirty="0"/>
               <a:t> (</a:t>
             </a:r>
             <a:r>
-              <a:rPr lang="en-US" dirty="0" err="1"/>
+              <a:rPr lang="en-US" sz="1600" dirty="0" err="1"/>
               <a:t>Obj</a:t>
             </a:r>
             <a:r>
-              <a:rPr lang="en-US" dirty="0"/>
+              <a:rPr lang="en-US" sz="1600" dirty="0"/>
               <a:t>) </a:t>
             </a:r>
             <a:r>
-              <a:rPr lang="en-US" dirty="0" err="1"/>
+              <a:rPr lang="en-US" sz="1600" dirty="0" err="1"/>
               <a:t>Bool</a:t>
             </a:r>
             <a:r>
-              <a:rPr lang="en-US" dirty="0"/>
+              <a:rPr lang="en-US" sz="1600" dirty="0"/>
               <a:t>)</a:t>
             </a:r>
           </a:p>
           <a:p>
             <a:r>
-              <a:rPr lang="en-US" dirty="0"/>
+              <a:rPr lang="en-US" sz="1600" dirty="0"/>
               <a:t>(declare-fun </a:t>
             </a:r>
             <a:r>
-              <a:rPr lang="en-US" dirty="0" err="1"/>
+              <a:rPr lang="en-US" sz="1600" dirty="0" err="1"/>
               <a:t>Author.books</a:t>
             </a:r>
             <a:r>
-              <a:rPr lang="en-US" dirty="0"/>
+              <a:rPr lang="en-US" sz="1600" dirty="0"/>
               <a:t> (</a:t>
             </a:r>
             <a:r>
-              <a:rPr lang="en-US" dirty="0" err="1"/>
+              <a:rPr lang="en-US" sz="1600" dirty="0" err="1"/>
               <a:t>Obj</a:t>
             </a:r>
             <a:r>
-              <a:rPr lang="en-US" dirty="0"/>
+              <a:rPr lang="en-US" sz="1600" dirty="0"/>
               <a:t> </a:t>
             </a:r>
             <a:r>
-              <a:rPr lang="en-US" dirty="0" err="1"/>
+              <a:rPr lang="en-US" sz="1600" dirty="0" err="1"/>
               <a:t>Obj</a:t>
             </a:r>
             <a:r>
-              <a:rPr lang="en-US" dirty="0"/>
+              <a:rPr lang="en-US" sz="1600" dirty="0"/>
               <a:t>) </a:t>
             </a:r>
             <a:r>
-              <a:rPr lang="en-US" dirty="0" err="1"/>
+              <a:rPr lang="en-US" sz="1600" dirty="0" err="1"/>
               <a:t>Bool</a:t>
             </a:r>
             <a:r>
-              <a:rPr lang="en-US" dirty="0"/>
+              <a:rPr lang="en-US" sz="1600" dirty="0"/>
               <a:t>)</a:t>
             </a:r>
           </a:p>
           <a:p>
             <a:r>
-              <a:rPr lang="en-US" dirty="0"/>
+              <a:rPr lang="en-US" sz="1600" dirty="0"/>
               <a:t>(assert (exists ((self </a:t>
             </a:r>
             <a:r>
-              <a:rPr lang="en-US" dirty="0" err="1"/>
+              <a:rPr lang="en-US" sz="1600" dirty="0" err="1"/>
               <a:t>Obj</a:t>
             </a:r>
             <a:r>
-              <a:rPr lang="en-US" dirty="0"/>
+              <a:rPr lang="en-US" sz="1600" dirty="0"/>
               <a:t>)) (Author self)))</a:t>
             </a:r>
           </a:p>
@@ -5848,8 +5848,8 @@
         </p:nvSpPr>
         <p:spPr>
           <a:xfrm>
-            <a:off x="1579352" y="661998"/>
-            <a:ext cx="5436492" cy="5632312"/>
+            <a:off x="2257296" y="66855"/>
+            <a:ext cx="4455386" cy="4985981"/>
           </a:xfrm>
           <a:prstGeom prst="rect">
             <a:avLst/>
@@ -5862,168 +5862,168 @@
           <a:lstStyle/>
           <a:p>
             <a:r>
-              <a:rPr lang="en-US" dirty="0" smtClean="0"/>
+              <a:rPr lang="en-US" sz="1600" dirty="0" smtClean="0"/>
               <a:t>;</a:t>
             </a:r>
             <a:r>
-              <a:rPr lang="en-US" dirty="0"/>
+              <a:rPr lang="en-US" sz="1600" dirty="0"/>
               <a:t>; </a:t>
             </a:r>
             <a:r>
-              <a:rPr lang="en-US" dirty="0" err="1"/>
+              <a:rPr lang="en-US" sz="1600" dirty="0" err="1"/>
               <a:t>disjointness</a:t>
             </a:r>
             <a:r>
-              <a:rPr lang="en-US" dirty="0"/>
+              <a:rPr lang="en-US" sz="1600" dirty="0"/>
               <a:t> of classes:</a:t>
             </a:r>
           </a:p>
           <a:p>
-            <a:endParaRPr lang="en-US" dirty="0"/>
-          </a:p>
-          <a:p>
-            <a:r>
-              <a:rPr lang="en-US" dirty="0"/>
+            <a:endParaRPr lang="en-US" sz="1600" dirty="0"/>
+          </a:p>
+          <a:p>
+            <a:r>
+              <a:rPr lang="en-US" sz="1600" dirty="0"/>
               <a:t>(assert</a:t>
             </a:r>
           </a:p>
           <a:p>
             <a:r>
-              <a:rPr lang="en-US" dirty="0"/>
+              <a:rPr lang="en-US" sz="1600" dirty="0"/>
               <a:t>  (</a:t>
             </a:r>
             <a:r>
-              <a:rPr lang="en-US" dirty="0" err="1"/>
+              <a:rPr lang="en-US" sz="1600" dirty="0" err="1"/>
               <a:t>forall</a:t>
             </a:r>
             <a:r>
-              <a:rPr lang="en-US" dirty="0"/>
+              <a:rPr lang="en-US" sz="1600" dirty="0"/>
               <a:t> ((self </a:t>
             </a:r>
             <a:r>
-              <a:rPr lang="en-US" dirty="0" err="1"/>
+              <a:rPr lang="en-US" sz="1600" dirty="0" err="1"/>
               <a:t>Obj</a:t>
             </a:r>
             <a:r>
-              <a:rPr lang="en-US" dirty="0"/>
+              <a:rPr lang="en-US" sz="1600" dirty="0"/>
               <a:t>))</a:t>
             </a:r>
           </a:p>
           <a:p>
             <a:r>
-              <a:rPr lang="en-US" dirty="0"/>
+              <a:rPr lang="en-US" sz="1600" dirty="0"/>
               <a:t>    (and</a:t>
             </a:r>
           </a:p>
           <a:p>
             <a:r>
-              <a:rPr lang="en-US" dirty="0"/>
+              <a:rPr lang="en-US" sz="1600" dirty="0"/>
               <a:t>      (not (and (Book self) (Author self)))</a:t>
             </a:r>
           </a:p>
           <a:p>
             <a:r>
-              <a:rPr lang="en-US" dirty="0"/>
+              <a:rPr lang="en-US" sz="1600" dirty="0"/>
               <a:t>    )</a:t>
             </a:r>
           </a:p>
           <a:p>
             <a:r>
-              <a:rPr lang="en-US" dirty="0"/>
+              <a:rPr lang="en-US" sz="1600" dirty="0"/>
               <a:t>  )</a:t>
             </a:r>
           </a:p>
           <a:p>
             <a:r>
-              <a:rPr lang="en-US" dirty="0" smtClean="0"/>
+              <a:rPr lang="en-US" sz="1600" dirty="0" smtClean="0"/>
               <a:t>)</a:t>
             </a:r>
           </a:p>
           <a:p>
-            <a:endParaRPr lang="en-US" dirty="0"/>
-          </a:p>
-          <a:p>
-            <a:r>
-              <a:rPr lang="en-US" dirty="0"/>
+            <a:endParaRPr lang="en-US" sz="1600" dirty="0"/>
+          </a:p>
+          <a:p>
+            <a:r>
+              <a:rPr lang="en-US" sz="1600" dirty="0"/>
               <a:t>;; invariants for class Book:</a:t>
             </a:r>
           </a:p>
           <a:p>
-            <a:endParaRPr lang="en-US" dirty="0"/>
-          </a:p>
-          <a:p>
-            <a:r>
-              <a:rPr lang="en-US" dirty="0"/>
+            <a:endParaRPr lang="en-US" sz="1600" dirty="0"/>
+          </a:p>
+          <a:p>
+            <a:r>
+              <a:rPr lang="en-US" sz="1600" dirty="0"/>
               <a:t>;; [</a:t>
             </a:r>
             <a:r>
-              <a:rPr lang="en-US" dirty="0" err="1"/>
+              <a:rPr lang="en-US" sz="1600" dirty="0" err="1"/>
               <a:t>pageLimit</a:t>
             </a:r>
             <a:r>
-              <a:rPr lang="en-US" dirty="0"/>
+              <a:rPr lang="en-US" sz="1600" dirty="0"/>
               <a:t>: pages &lt; 300]</a:t>
             </a:r>
           </a:p>
           <a:p>
-            <a:endParaRPr lang="en-US" dirty="0"/>
-          </a:p>
-          <a:p>
-            <a:r>
-              <a:rPr lang="en-US" dirty="0"/>
+            <a:endParaRPr lang="en-US" sz="1600" dirty="0"/>
+          </a:p>
+          <a:p>
+            <a:r>
+              <a:rPr lang="en-US" sz="1600" dirty="0"/>
               <a:t>(assert</a:t>
             </a:r>
           </a:p>
           <a:p>
             <a:r>
-              <a:rPr lang="en-US" dirty="0"/>
+              <a:rPr lang="en-US" sz="1600" dirty="0"/>
               <a:t>  (</a:t>
             </a:r>
             <a:r>
-              <a:rPr lang="en-US" dirty="0" err="1"/>
+              <a:rPr lang="en-US" sz="1600" dirty="0" err="1"/>
               <a:t>forall</a:t>
             </a:r>
             <a:r>
-              <a:rPr lang="en-US" dirty="0"/>
+              <a:rPr lang="en-US" sz="1600" dirty="0"/>
               <a:t> ((self </a:t>
             </a:r>
             <a:r>
-              <a:rPr lang="en-US" dirty="0" err="1"/>
+              <a:rPr lang="en-US" sz="1600" dirty="0" err="1"/>
               <a:t>Obj</a:t>
             </a:r>
             <a:r>
-              <a:rPr lang="en-US" dirty="0"/>
+              <a:rPr lang="en-US" sz="1600" dirty="0"/>
               <a:t>))</a:t>
             </a:r>
           </a:p>
           <a:p>
             <a:r>
-              <a:rPr lang="en-US" dirty="0"/>
+              <a:rPr lang="en-US" sz="1600" dirty="0"/>
               <a:t>    (=&gt; (Book self) (&lt; (</a:t>
             </a:r>
             <a:r>
-              <a:rPr lang="en-US" dirty="0" err="1"/>
+              <a:rPr lang="en-US" sz="1600" dirty="0" err="1"/>
               <a:t>Book.pages</a:t>
             </a:r>
             <a:r>
-              <a:rPr lang="en-US" dirty="0"/>
+              <a:rPr lang="en-US" sz="1600" dirty="0"/>
               <a:t> self) 300))</a:t>
             </a:r>
           </a:p>
           <a:p>
             <a:r>
-              <a:rPr lang="en-US" dirty="0"/>
+              <a:rPr lang="en-US" sz="1600" dirty="0"/>
               <a:t>  )</a:t>
             </a:r>
           </a:p>
           <a:p>
             <a:r>
-              <a:rPr lang="en-US" dirty="0"/>
+              <a:rPr lang="en-US" sz="1600" dirty="0"/>
               <a:t>)</a:t>
             </a:r>
           </a:p>
           <a:p>
-            <a:endParaRPr lang="en-US" dirty="0"/>
+            <a:endParaRPr lang="en-US" sz="1400" dirty="0"/>
           </a:p>
         </p:txBody>
       </p:sp>
@@ -6072,8 +6072,8 @@
         </p:nvSpPr>
         <p:spPr>
           <a:xfrm>
-            <a:off x="1410103" y="39666"/>
-            <a:ext cx="6633553" cy="6740308"/>
+            <a:off x="1410103" y="30117"/>
+            <a:ext cx="6633553" cy="5047535"/>
           </a:xfrm>
           <a:prstGeom prst="rect">
             <a:avLst/>
@@ -6086,326 +6086,323 @@
           <a:lstStyle/>
           <a:p>
             <a:r>
-              <a:rPr lang="en-US" dirty="0"/>
+              <a:rPr lang="en-US" sz="1400" dirty="0"/>
               <a:t>;; [</a:t>
             </a:r>
             <a:r>
-              <a:rPr lang="en-US" dirty="0" err="1"/>
+              <a:rPr lang="en-US" sz="1400" dirty="0" err="1"/>
               <a:t>atLeastOneAuthor</a:t>
             </a:r>
             <a:r>
-              <a:rPr lang="en-US" dirty="0"/>
+              <a:rPr lang="en-US" sz="1400" dirty="0"/>
               <a:t>: authors-&gt;exists(a | true)]</a:t>
             </a:r>
           </a:p>
           <a:p>
-            <a:endParaRPr lang="en-US" dirty="0"/>
-          </a:p>
-          <a:p>
-            <a:r>
-              <a:rPr lang="en-US" dirty="0"/>
+            <a:endParaRPr lang="en-US" sz="1400" dirty="0"/>
+          </a:p>
+          <a:p>
+            <a:r>
+              <a:rPr lang="en-US" sz="1400" dirty="0"/>
               <a:t>(assert</a:t>
             </a:r>
           </a:p>
           <a:p>
             <a:r>
-              <a:rPr lang="en-US" dirty="0"/>
+              <a:rPr lang="en-US" sz="1400" dirty="0"/>
               <a:t>   (</a:t>
             </a:r>
             <a:r>
-              <a:rPr lang="en-US" dirty="0" err="1"/>
+              <a:rPr lang="en-US" sz="1400" dirty="0" err="1"/>
               <a:t>forall</a:t>
             </a:r>
             <a:r>
-              <a:rPr lang="en-US" dirty="0"/>
+              <a:rPr lang="en-US" sz="1400" dirty="0"/>
               <a:t> ((self </a:t>
             </a:r>
             <a:r>
-              <a:rPr lang="en-US" dirty="0" err="1"/>
+              <a:rPr lang="en-US" sz="1400" dirty="0" err="1"/>
               <a:t>Obj</a:t>
             </a:r>
             <a:r>
-              <a:rPr lang="en-US" dirty="0"/>
+              <a:rPr lang="en-US" sz="1400" dirty="0"/>
               <a:t>))</a:t>
             </a:r>
           </a:p>
           <a:p>
             <a:r>
-              <a:rPr lang="en-US" dirty="0"/>
+              <a:rPr lang="en-US" sz="1400" dirty="0"/>
               <a:t>      (=&gt; </a:t>
             </a:r>
           </a:p>
           <a:p>
             <a:r>
-              <a:rPr lang="en-US" dirty="0"/>
+              <a:rPr lang="en-US" sz="1400" dirty="0"/>
               <a:t>         (Book self) </a:t>
             </a:r>
           </a:p>
           <a:p>
             <a:r>
-              <a:rPr lang="en-US" dirty="0"/>
+              <a:rPr lang="en-US" sz="1400" dirty="0"/>
               <a:t>        </a:t>
             </a:r>
             <a:r>
-              <a:rPr lang="en-US" dirty="0" smtClean="0"/>
+              <a:rPr lang="en-US" sz="1400" dirty="0" smtClean="0"/>
               <a:t> (</a:t>
             </a:r>
             <a:r>
-              <a:rPr lang="en-US" dirty="0"/>
+              <a:rPr lang="en-US" sz="1400" dirty="0"/>
               <a:t>exists ((a </a:t>
             </a:r>
             <a:r>
-              <a:rPr lang="en-US" dirty="0" err="1"/>
+              <a:rPr lang="en-US" sz="1400" dirty="0" err="1"/>
               <a:t>Obj</a:t>
             </a:r>
             <a:r>
-              <a:rPr lang="en-US" dirty="0"/>
+              <a:rPr lang="en-US" sz="1400" dirty="0"/>
               <a:t>)) (and (Author a) (</a:t>
             </a:r>
             <a:r>
-              <a:rPr lang="en-US" dirty="0" err="1"/>
+              <a:rPr lang="en-US" sz="1400" dirty="0" err="1"/>
               <a:t>Book.authors</a:t>
             </a:r>
             <a:r>
-              <a:rPr lang="en-US" dirty="0"/>
+              <a:rPr lang="en-US" sz="1400" dirty="0"/>
               <a:t> self a) true)))</a:t>
             </a:r>
           </a:p>
           <a:p>
             <a:r>
-              <a:rPr lang="en-US" dirty="0"/>
+              <a:rPr lang="en-US" sz="1400" dirty="0"/>
               <a:t>   )</a:t>
             </a:r>
           </a:p>
           <a:p>
             <a:r>
-              <a:rPr lang="en-US" dirty="0"/>
+              <a:rPr lang="en-US" sz="1400" dirty="0"/>
               <a:t>)</a:t>
             </a:r>
           </a:p>
           <a:p>
-            <a:endParaRPr lang="en-US" dirty="0" smtClean="0"/>
-          </a:p>
-          <a:p>
-            <a:endParaRPr lang="en-US" dirty="0"/>
-          </a:p>
-          <a:p>
-            <a:r>
-              <a:rPr lang="en-US" dirty="0" smtClean="0"/>
+            <a:endParaRPr lang="en-US" sz="1400" dirty="0"/>
+          </a:p>
+          <a:p>
+            <a:r>
+              <a:rPr lang="en-US" sz="1400" dirty="0" smtClean="0"/>
               <a:t>;</a:t>
             </a:r>
             <a:r>
-              <a:rPr lang="en-US" dirty="0"/>
+              <a:rPr lang="en-US" sz="1400" dirty="0"/>
               <a:t>; [</a:t>
             </a:r>
             <a:r>
-              <a:rPr lang="en-US" dirty="0" err="1" smtClean="0"/>
+              <a:rPr lang="en-US" sz="1400" dirty="0" err="1" smtClean="0"/>
               <a:t>allAuthorsApproved</a:t>
             </a:r>
             <a:r>
-              <a:rPr lang="en-US" dirty="0"/>
+              <a:rPr lang="en-US" sz="1400" dirty="0"/>
               <a:t>: authors-&gt;</a:t>
             </a:r>
             <a:r>
-              <a:rPr lang="en-US" dirty="0" err="1"/>
+              <a:rPr lang="en-US" sz="1400" dirty="0" err="1"/>
               <a:t>forAll</a:t>
             </a:r>
             <a:r>
-              <a:rPr lang="en-US" dirty="0"/>
+              <a:rPr lang="en-US" sz="1400" dirty="0"/>
               <a:t>(a | </a:t>
             </a:r>
             <a:r>
-              <a:rPr lang="en-US" dirty="0" err="1"/>
+              <a:rPr lang="en-US" sz="1400" dirty="0" err="1"/>
               <a:t>a.approved</a:t>
             </a:r>
             <a:r>
-              <a:rPr lang="en-US" dirty="0"/>
+              <a:rPr lang="en-US" sz="1400" dirty="0"/>
               <a:t>)]</a:t>
             </a:r>
           </a:p>
           <a:p>
-            <a:endParaRPr lang="en-US" dirty="0"/>
-          </a:p>
-          <a:p>
-            <a:r>
-              <a:rPr lang="en-US" dirty="0"/>
+            <a:endParaRPr lang="en-US" sz="1400" dirty="0"/>
+          </a:p>
+          <a:p>
+            <a:r>
+              <a:rPr lang="en-US" sz="1400" dirty="0"/>
               <a:t>(assert</a:t>
             </a:r>
           </a:p>
           <a:p>
             <a:r>
-              <a:rPr lang="en-US" dirty="0"/>
+              <a:rPr lang="en-US" sz="1400" dirty="0"/>
               <a:t>  </a:t>
             </a:r>
             <a:r>
-              <a:rPr lang="en-US" dirty="0" smtClean="0"/>
+              <a:rPr lang="en-US" sz="1400" dirty="0" smtClean="0"/>
               <a:t> (</a:t>
             </a:r>
             <a:r>
-              <a:rPr lang="en-US" dirty="0" err="1"/>
+              <a:rPr lang="en-US" sz="1400" dirty="0" err="1"/>
               <a:t>forall</a:t>
             </a:r>
             <a:r>
-              <a:rPr lang="en-US" dirty="0"/>
+              <a:rPr lang="en-US" sz="1400" dirty="0"/>
               <a:t> ((self </a:t>
             </a:r>
             <a:r>
-              <a:rPr lang="en-US" dirty="0" err="1"/>
+              <a:rPr lang="en-US" sz="1400" dirty="0" err="1"/>
               <a:t>Obj</a:t>
             </a:r>
             <a:r>
-              <a:rPr lang="en-US" dirty="0"/>
+              <a:rPr lang="en-US" sz="1400" dirty="0"/>
               <a:t>))</a:t>
             </a:r>
           </a:p>
           <a:p>
             <a:r>
-              <a:rPr lang="en-US" dirty="0"/>
+              <a:rPr lang="en-US" sz="1400" dirty="0"/>
               <a:t>   </a:t>
             </a:r>
             <a:r>
-              <a:rPr lang="en-US" dirty="0" smtClean="0"/>
+              <a:rPr lang="en-US" sz="1400" dirty="0" smtClean="0"/>
               <a:t>    </a:t>
             </a:r>
             <a:r>
-              <a:rPr lang="en-US" dirty="0"/>
+              <a:rPr lang="en-US" sz="1400" dirty="0"/>
               <a:t>(=&gt; </a:t>
             </a:r>
-            <a:endParaRPr lang="en-US" dirty="0" smtClean="0"/>
-          </a:p>
-          <a:p>
-            <a:r>
-              <a:rPr lang="en-US" dirty="0"/>
+            <a:endParaRPr lang="en-US" sz="1400" dirty="0" smtClean="0"/>
+          </a:p>
+          <a:p>
+            <a:r>
+              <a:rPr lang="en-US" sz="1400" dirty="0"/>
               <a:t> </a:t>
             </a:r>
             <a:r>
-              <a:rPr lang="en-US" dirty="0" smtClean="0"/>
+              <a:rPr lang="en-US" sz="1400" dirty="0" smtClean="0"/>
               <a:t>         (</a:t>
             </a:r>
             <a:r>
-              <a:rPr lang="en-US" dirty="0"/>
+              <a:rPr lang="en-US" sz="1400" dirty="0"/>
               <a:t>Book self) </a:t>
             </a:r>
-            <a:endParaRPr lang="en-US" dirty="0" smtClean="0"/>
-          </a:p>
-          <a:p>
-            <a:r>
-              <a:rPr lang="en-US" dirty="0"/>
+            <a:endParaRPr lang="en-US" sz="1400" dirty="0" smtClean="0"/>
+          </a:p>
+          <a:p>
+            <a:r>
+              <a:rPr lang="en-US" sz="1400" dirty="0"/>
               <a:t> </a:t>
             </a:r>
             <a:r>
-              <a:rPr lang="en-US" dirty="0" smtClean="0"/>
+              <a:rPr lang="en-US" sz="1400" dirty="0" smtClean="0"/>
               <a:t>         (</a:t>
             </a:r>
             <a:r>
-              <a:rPr lang="en-US" dirty="0" err="1"/>
+              <a:rPr lang="en-US" sz="1400" dirty="0" err="1"/>
               <a:t>forall</a:t>
             </a:r>
             <a:r>
-              <a:rPr lang="en-US" dirty="0"/>
+              <a:rPr lang="en-US" sz="1400" dirty="0"/>
               <a:t> ((a </a:t>
             </a:r>
             <a:r>
-              <a:rPr lang="en-US" dirty="0" err="1"/>
+              <a:rPr lang="en-US" sz="1400" dirty="0" err="1"/>
               <a:t>Obj</a:t>
             </a:r>
             <a:r>
-              <a:rPr lang="en-US" dirty="0"/>
+              <a:rPr lang="en-US" sz="1400" dirty="0"/>
               <a:t>)) </a:t>
             </a:r>
-            <a:endParaRPr lang="en-US" dirty="0" smtClean="0"/>
-          </a:p>
-          <a:p>
-            <a:r>
-              <a:rPr lang="en-US" dirty="0"/>
+            <a:endParaRPr lang="en-US" sz="1400" dirty="0" smtClean="0"/>
+          </a:p>
+          <a:p>
+            <a:r>
+              <a:rPr lang="en-US" sz="1400" dirty="0"/>
               <a:t> </a:t>
             </a:r>
             <a:r>
-              <a:rPr lang="en-US" dirty="0" smtClean="0"/>
+              <a:rPr lang="en-US" sz="1400" dirty="0" smtClean="0"/>
               <a:t>      </a:t>
             </a:r>
             <a:r>
-              <a:rPr lang="en-US" dirty="0"/>
+              <a:rPr lang="en-US" sz="1400" dirty="0"/>
               <a:t> </a:t>
             </a:r>
             <a:r>
-              <a:rPr lang="en-US" dirty="0" smtClean="0"/>
+              <a:rPr lang="en-US" sz="1400" dirty="0" smtClean="0"/>
               <a:t>     (</a:t>
             </a:r>
             <a:r>
-              <a:rPr lang="en-US" dirty="0"/>
+              <a:rPr lang="en-US" sz="1400" dirty="0"/>
               <a:t>=&gt; </a:t>
             </a:r>
-            <a:endParaRPr lang="en-US" dirty="0" smtClean="0"/>
-          </a:p>
-          <a:p>
-            <a:r>
-              <a:rPr lang="en-US" dirty="0"/>
+            <a:endParaRPr lang="en-US" sz="1400" dirty="0" smtClean="0"/>
+          </a:p>
+          <a:p>
+            <a:r>
+              <a:rPr lang="en-US" sz="1400" dirty="0"/>
               <a:t> </a:t>
             </a:r>
             <a:r>
-              <a:rPr lang="en-US" dirty="0" smtClean="0"/>
+              <a:rPr lang="en-US" sz="1400" dirty="0" smtClean="0"/>
               <a:t>               (</a:t>
             </a:r>
             <a:r>
-              <a:rPr lang="en-US" dirty="0"/>
+              <a:rPr lang="en-US" sz="1400" dirty="0"/>
               <a:t>and (Author a) (</a:t>
             </a:r>
             <a:r>
-              <a:rPr lang="en-US" dirty="0" err="1"/>
+              <a:rPr lang="en-US" sz="1400" dirty="0" err="1"/>
               <a:t>Book.authors</a:t>
             </a:r>
             <a:r>
-              <a:rPr lang="en-US" dirty="0"/>
+              <a:rPr lang="en-US" sz="1400" dirty="0"/>
               <a:t> self a)) </a:t>
             </a:r>
-            <a:endParaRPr lang="en-US" dirty="0" smtClean="0"/>
-          </a:p>
-          <a:p>
-            <a:r>
-              <a:rPr lang="en-US" dirty="0"/>
+            <a:endParaRPr lang="en-US" sz="1400" dirty="0" smtClean="0"/>
+          </a:p>
+          <a:p>
+            <a:r>
+              <a:rPr lang="en-US" sz="1400" dirty="0"/>
               <a:t> </a:t>
             </a:r>
             <a:r>
-              <a:rPr lang="en-US" dirty="0" smtClean="0"/>
+              <a:rPr lang="en-US" sz="1400" dirty="0" smtClean="0"/>
               <a:t>               (</a:t>
             </a:r>
             <a:r>
-              <a:rPr lang="en-US" dirty="0" err="1"/>
+              <a:rPr lang="en-US" sz="1400" dirty="0" err="1"/>
               <a:t>Author.approved</a:t>
             </a:r>
             <a:r>
-              <a:rPr lang="en-US" dirty="0"/>
+              <a:rPr lang="en-US" sz="1400" dirty="0"/>
               <a:t> a)</a:t>
             </a:r>
             <a:r>
-              <a:rPr lang="en-US" dirty="0" smtClean="0"/>
+              <a:rPr lang="en-US" sz="1400" dirty="0" smtClean="0"/>
               <a:t>))</a:t>
             </a:r>
           </a:p>
           <a:p>
             <a:r>
-              <a:rPr lang="en-US" dirty="0"/>
+              <a:rPr lang="en-US" sz="1400" dirty="0"/>
               <a:t> </a:t>
             </a:r>
             <a:r>
-              <a:rPr lang="en-US" dirty="0" smtClean="0"/>
+              <a:rPr lang="en-US" sz="1400" dirty="0" smtClean="0"/>
               <a:t>     )</a:t>
             </a:r>
           </a:p>
           <a:p>
             <a:r>
-              <a:rPr lang="en-US" dirty="0" smtClean="0"/>
+              <a:rPr lang="en-US" sz="1400" dirty="0" smtClean="0"/>
               <a:t>   )</a:t>
             </a:r>
-            <a:endParaRPr lang="en-US" dirty="0"/>
-          </a:p>
-          <a:p>
-            <a:r>
-              <a:rPr lang="en-US" dirty="0" smtClean="0"/>
+            <a:endParaRPr lang="en-US" sz="1400" dirty="0"/>
+          </a:p>
+          <a:p>
+            <a:r>
+              <a:rPr lang="en-US" sz="1400" dirty="0" smtClean="0"/>
               <a:t>)</a:t>
             </a:r>
-            <a:endParaRPr lang="en-US" dirty="0"/>
+            <a:endParaRPr lang="en-US" sz="1400" dirty="0"/>
           </a:p>
         </p:txBody>
       </p:sp>
@@ -6727,8 +6724,27 @@
                   </a:schemeClr>
                 </a:solidFill>
               </a:rPr>
-              <a:t> visitor</a:t>
-            </a:r>
+              <a:t> </a:t>
+            </a:r>
+            <a:r>
+              <a:rPr lang="en-US" dirty="0" smtClean="0">
+                <a:solidFill>
+                  <a:schemeClr val="accent4">
+                    <a:lumMod val="60000"/>
+                    <a:lumOff val="40000"/>
+                  </a:schemeClr>
+                </a:solidFill>
+              </a:rPr>
+              <a:t>structure visitor</a:t>
+            </a:r>
+            <a:endParaRPr lang="en-US" dirty="0" smtClean="0">
+              <a:solidFill>
+                <a:schemeClr val="accent4">
+                  <a:lumMod val="60000"/>
+                  <a:lumOff val="40000"/>
+                </a:schemeClr>
+              </a:solidFill>
+            </a:endParaRPr>
           </a:p>
           <a:p>
             <a:pPr marL="285750" indent="-285750">
@@ -7148,8 +7164,17 @@
           <a:p>
             <a:r>
               <a:rPr lang="en-US" dirty="0" smtClean="0"/>
-              <a:t>The following languages have been compared:</a:t>
-            </a:r>
+              <a:t>Compare the </a:t>
+            </a:r>
+            <a:r>
+              <a:rPr lang="en-US" dirty="0" smtClean="0"/>
+              <a:t>following </a:t>
+            </a:r>
+            <a:r>
+              <a:rPr lang="en-US" dirty="0" smtClean="0"/>
+              <a:t>textual languages:</a:t>
+            </a:r>
+            <a:endParaRPr lang="en-US" dirty="0" smtClean="0"/>
           </a:p>
           <a:p>
             <a:pPr lvl="1"/>
@@ -7326,7 +7351,23 @@
           <a:p>
             <a:r>
               <a:rPr lang="en-US" dirty="0" smtClean="0"/>
-              <a:t>The following wrongly typed model is not flagged as such</a:t>
+              <a:t>The following wrongly typed model is </a:t>
+            </a:r>
+            <a:r>
+              <a:rPr lang="en-US" b="1" dirty="0" smtClean="0">
+                <a:solidFill>
+                  <a:srgbClr val="FF0000"/>
+                </a:solidFill>
+              </a:rPr>
+              <a:t>not</a:t>
+            </a:r>
+            <a:r>
+              <a:rPr lang="en-US" dirty="0" smtClean="0"/>
+              <a:t> flagged as </a:t>
+            </a:r>
+            <a:r>
+              <a:rPr lang="en-US" dirty="0" smtClean="0"/>
+              <a:t>such </a:t>
             </a:r>
             <a:endParaRPr lang="en-US" dirty="0"/>
           </a:p>
@@ -7542,8 +7583,8 @@
         </p:nvSpPr>
         <p:spPr>
           <a:xfrm>
-            <a:off x="7537462" y="424875"/>
-            <a:ext cx="1576649" cy="1200329"/>
+            <a:off x="7430003" y="161112"/>
+            <a:ext cx="1624664" cy="2308324"/>
           </a:xfrm>
           <a:prstGeom prst="rect">
             <a:avLst/>
@@ -7601,7 +7642,47 @@
             </a:r>
             <a:r>
               <a:rPr lang="en-US" dirty="0" smtClean="0"/>
-              <a:t>lass Author.</a:t>
+              <a:t>lass Author</a:t>
+            </a:r>
+            <a:r>
+              <a:rPr lang="en-US" dirty="0" smtClean="0"/>
+              <a:t>.</a:t>
+            </a:r>
+          </a:p>
+          <a:p>
+            <a:r>
+              <a:rPr lang="en-US" dirty="0" smtClean="0"/>
+              <a:t>We should </a:t>
+            </a:r>
+          </a:p>
+          <a:p>
+            <a:r>
+              <a:rPr lang="en-US" dirty="0"/>
+              <a:t>p</a:t>
+            </a:r>
+            <a:r>
+              <a:rPr lang="en-US" dirty="0" smtClean="0"/>
+              <a:t>rovide a such</a:t>
+            </a:r>
+          </a:p>
+          <a:p>
+            <a:r>
+              <a:rPr lang="en-US" dirty="0"/>
+              <a:t>t</a:t>
+            </a:r>
+            <a:r>
+              <a:rPr lang="en-US" dirty="0" smtClean="0"/>
+              <a:t>o make this</a:t>
+            </a:r>
+          </a:p>
+          <a:p>
+            <a:r>
+              <a:rPr lang="en-US" dirty="0"/>
+              <a:t>m</a:t>
+            </a:r>
+            <a:r>
+              <a:rPr lang="en-US" dirty="0" smtClean="0"/>
+              <a:t>odel correct.</a:t>
             </a:r>
             <a:endParaRPr lang="en-US" dirty="0"/>
           </a:p>
@@ -7661,7 +7742,7 @@
           <a:p>
             <a:r>
               <a:rPr lang="en-US" dirty="0" smtClean="0"/>
-              <a:t>The Shapes Model</a:t>
+              <a:t>The Library Model</a:t>
             </a:r>
             <a:endParaRPr lang="en-US" dirty="0"/>
           </a:p>
@@ -7669,7 +7750,7 @@
       </p:sp>
       <p:sp>
         <p:nvSpPr>
-          <p:cNvPr id="6" name="Text Placeholder 4"/>
+          <p:cNvPr id="5" name="Text Placeholder 4"/>
           <p:cNvSpPr>
             <a:spLocks noGrp="1"/>
           </p:cNvSpPr>
@@ -7685,7 +7766,7 @@
         </p:spPr>
         <p:txBody>
           <a:bodyPr>
-            <a:normAutofit fontScale="92500" lnSpcReduction="20000"/>
+            <a:normAutofit/>
           </a:bodyPr>
           <a:lstStyle/>
           <a:p>
@@ -7720,16 +7801,6 @@
               </a:rPr>
               <a:t>Scala</a:t>
             </a:r>
-          </a:p>
-          <a:p>
-            <a:r>
-              <a:rPr lang="en-US" dirty="0" smtClean="0">
-                <a:solidFill>
-                  <a:srgbClr val="FF0000"/>
-                </a:solidFill>
-              </a:rPr>
-              <a:t>Java</a:t>
-            </a:r>
             <a:endParaRPr lang="en-US" dirty="0">
               <a:solidFill>
                 <a:srgbClr val="FF0000"/>
@@ -7738,10 +7809,76 @@
           </a:p>
         </p:txBody>
       </p:sp>
+      <p:sp>
+        <p:nvSpPr>
+          <p:cNvPr id="6" name="TextBox 5"/>
+          <p:cNvSpPr txBox="1"/>
+          <p:nvPr/>
+        </p:nvSpPr>
+        <p:spPr>
+          <a:xfrm>
+            <a:off x="1852433" y="3759202"/>
+            <a:ext cx="5492572" cy="923330"/>
+          </a:xfrm>
+          <a:prstGeom prst="rect">
+            <a:avLst/>
+          </a:prstGeom>
+          <a:noFill/>
+        </p:spPr>
+        <p:txBody>
+          <a:bodyPr wrap="none" rtlCol="0">
+            <a:spAutoFit/>
+          </a:bodyPr>
+          <a:lstStyle/>
+          <a:p>
+            <a:r>
+              <a:rPr lang="en-US" dirty="0" smtClean="0">
+                <a:solidFill>
+                  <a:srgbClr val="FFFF00"/>
+                </a:solidFill>
+              </a:rPr>
+              <a:t>Demonstrates richer OCL expressions in OCLInEcore</a:t>
+            </a:r>
+          </a:p>
+          <a:p>
+            <a:r>
+              <a:rPr lang="en-US" dirty="0">
+                <a:solidFill>
+                  <a:srgbClr val="FFFF00"/>
+                </a:solidFill>
+              </a:rPr>
+              <a:t>c</a:t>
+            </a:r>
+            <a:r>
+              <a:rPr lang="en-US" dirty="0" smtClean="0">
+                <a:solidFill>
+                  <a:srgbClr val="FFFF00"/>
+                </a:solidFill>
+              </a:rPr>
+              <a:t>orresponding to Set/Bag comprehensions in K.</a:t>
+            </a:r>
+          </a:p>
+          <a:p>
+            <a:r>
+              <a:rPr lang="en-US" dirty="0" smtClean="0">
+                <a:solidFill>
+                  <a:srgbClr val="FFFF00"/>
+                </a:solidFill>
+              </a:rPr>
+              <a:t>Scala supports OCL-like notation (very similar).</a:t>
+            </a:r>
+            <a:endParaRPr lang="en-US" dirty="0">
+              <a:solidFill>
+                <a:srgbClr val="FFFF00"/>
+              </a:solidFill>
+            </a:endParaRPr>
+          </a:p>
+        </p:txBody>
+      </p:sp>
     </p:spTree>
     <p:extLst>
       <p:ext uri="{BB962C8B-B14F-4D97-AF65-F5344CB8AC3E}">
-        <p14:creationId xmlns:p14="http://schemas.microsoft.com/office/powerpoint/2010/main" val="3202098064"/>
+        <p14:creationId xmlns:p14="http://schemas.microsoft.com/office/powerpoint/2010/main" val="2258844799"/>
       </p:ext>
     </p:extLst>
   </p:cSld>
@@ -7759,1088 +7896,6 @@
 </file>
 
 <file path=ppt/slides/slide23.xml><?xml version="1.0" encoding="utf-8"?>
-<p:sld xmlns:a="http://schemas.openxmlformats.org/drawingml/2006/main" xmlns:r="http://schemas.openxmlformats.org/officeDocument/2006/relationships" xmlns:p="http://schemas.openxmlformats.org/presentationml/2006/main">
-  <p:cSld>
-    <p:spTree>
-      <p:nvGrpSpPr>
-        <p:cNvPr id="1" name=""/>
-        <p:cNvGrpSpPr/>
-        <p:nvPr/>
-      </p:nvGrpSpPr>
-      <p:grpSpPr>
-        <a:xfrm>
-          <a:off x="0" y="0"/>
-          <a:ext cx="0" cy="0"/>
-          <a:chOff x="0" y="0"/>
-          <a:chExt cx="0" cy="0"/>
-        </a:xfrm>
-      </p:grpSpPr>
-      <p:pic>
-        <p:nvPicPr>
-          <p:cNvPr id="6" name="Picture 5" descr="Screen Shot 2016-02-04 at 2.35.49 PM.png"/>
-          <p:cNvPicPr>
-            <a:picLocks noChangeAspect="1"/>
-          </p:cNvPicPr>
-          <p:nvPr/>
-        </p:nvPicPr>
-        <p:blipFill>
-          <a:blip r:embed="rId2">
-            <a:extLst>
-              <a:ext uri="{28A0092B-C50C-407E-A947-70E740481C1C}">
-                <a14:useLocalDpi xmlns:a14="http://schemas.microsoft.com/office/drawing/2010/main" val="0"/>
-              </a:ext>
-            </a:extLst>
-          </a:blip>
-          <a:stretch>
-            <a:fillRect/>
-          </a:stretch>
-        </p:blipFill>
-        <p:spPr>
-          <a:xfrm>
-            <a:off x="0" y="0"/>
-            <a:ext cx="2877877" cy="5143500"/>
-          </a:xfrm>
-          <a:prstGeom prst="rect">
-            <a:avLst/>
-          </a:prstGeom>
-        </p:spPr>
-      </p:pic>
-      <p:pic>
-        <p:nvPicPr>
-          <p:cNvPr id="7" name="Picture 6" descr="Screen Shot 2016-02-04 at 2.36.19 PM.png"/>
-          <p:cNvPicPr>
-            <a:picLocks noChangeAspect="1"/>
-          </p:cNvPicPr>
-          <p:nvPr/>
-        </p:nvPicPr>
-        <p:blipFill>
-          <a:blip r:embed="rId3">
-            <a:extLst>
-              <a:ext uri="{28A0092B-C50C-407E-A947-70E740481C1C}">
-                <a14:useLocalDpi xmlns:a14="http://schemas.microsoft.com/office/drawing/2010/main" val="0"/>
-              </a:ext>
-            </a:extLst>
-          </a:blip>
-          <a:stretch>
-            <a:fillRect/>
-          </a:stretch>
-        </p:blipFill>
-        <p:spPr>
-          <a:xfrm>
-            <a:off x="2877877" y="0"/>
-            <a:ext cx="3573249" cy="5143500"/>
-          </a:xfrm>
-          <a:prstGeom prst="rect">
-            <a:avLst/>
-          </a:prstGeom>
-        </p:spPr>
-      </p:pic>
-      <p:pic>
-        <p:nvPicPr>
-          <p:cNvPr id="9" name="Picture 8"/>
-          <p:cNvPicPr>
-            <a:picLocks noChangeAspect="1"/>
-          </p:cNvPicPr>
-          <p:nvPr/>
-        </p:nvPicPr>
-        <p:blipFill>
-          <a:blip r:embed="rId4"/>
-          <a:stretch>
-            <a:fillRect/>
-          </a:stretch>
-        </p:blipFill>
-        <p:spPr>
-          <a:xfrm>
-            <a:off x="6357048" y="0"/>
-            <a:ext cx="2891070" cy="5143500"/>
-          </a:xfrm>
-          <a:prstGeom prst="rect">
-            <a:avLst/>
-          </a:prstGeom>
-        </p:spPr>
-      </p:pic>
-      <p:sp>
-        <p:nvSpPr>
-          <p:cNvPr id="10" name="TextBox 9"/>
-          <p:cNvSpPr txBox="1"/>
-          <p:nvPr/>
-        </p:nvSpPr>
-        <p:spPr>
-          <a:xfrm>
-            <a:off x="2240626" y="43657"/>
-            <a:ext cx="325730" cy="307777"/>
-          </a:xfrm>
-          <a:prstGeom prst="rect">
-            <a:avLst/>
-          </a:prstGeom>
-          <a:noFill/>
-        </p:spPr>
-        <p:txBody>
-          <a:bodyPr wrap="none" rtlCol="0">
-            <a:spAutoFit/>
-          </a:bodyPr>
-          <a:lstStyle/>
-          <a:p>
-            <a:r>
-              <a:rPr lang="en-US" sz="1400" dirty="0">
-                <a:solidFill>
-                  <a:srgbClr val="FF0000"/>
-                </a:solidFill>
-              </a:rPr>
-              <a:t>K</a:t>
-            </a:r>
-          </a:p>
-        </p:txBody>
-      </p:sp>
-      <p:sp>
-        <p:nvSpPr>
-          <p:cNvPr id="11" name="TextBox 10"/>
-          <p:cNvSpPr txBox="1"/>
-          <p:nvPr/>
-        </p:nvSpPr>
-        <p:spPr>
-          <a:xfrm>
-            <a:off x="5011458" y="62306"/>
-            <a:ext cx="1181671" cy="307777"/>
-          </a:xfrm>
-          <a:prstGeom prst="rect">
-            <a:avLst/>
-          </a:prstGeom>
-          <a:noFill/>
-        </p:spPr>
-        <p:txBody>
-          <a:bodyPr wrap="none" rtlCol="0">
-            <a:spAutoFit/>
-          </a:bodyPr>
-          <a:lstStyle/>
-          <a:p>
-            <a:r>
-              <a:rPr lang="en-US" sz="1400" dirty="0" smtClean="0">
-                <a:solidFill>
-                  <a:srgbClr val="FF0000"/>
-                </a:solidFill>
-              </a:rPr>
-              <a:t>OCLInEcore</a:t>
-            </a:r>
-            <a:endParaRPr lang="en-US" sz="1400" dirty="0">
-              <a:solidFill>
-                <a:srgbClr val="FF0000"/>
-              </a:solidFill>
-            </a:endParaRPr>
-          </a:p>
-        </p:txBody>
-      </p:sp>
-      <p:sp>
-        <p:nvSpPr>
-          <p:cNvPr id="12" name="TextBox 11"/>
-          <p:cNvSpPr txBox="1"/>
-          <p:nvPr/>
-        </p:nvSpPr>
-        <p:spPr>
-          <a:xfrm>
-            <a:off x="8371898" y="33765"/>
-            <a:ext cx="595035" cy="307777"/>
-          </a:xfrm>
-          <a:prstGeom prst="rect">
-            <a:avLst/>
-          </a:prstGeom>
-          <a:noFill/>
-        </p:spPr>
-        <p:txBody>
-          <a:bodyPr wrap="none" rtlCol="0">
-            <a:spAutoFit/>
-          </a:bodyPr>
-          <a:lstStyle/>
-          <a:p>
-            <a:r>
-              <a:rPr lang="en-US" sz="1400" dirty="0" smtClean="0">
-                <a:solidFill>
-                  <a:srgbClr val="FF0000"/>
-                </a:solidFill>
-              </a:rPr>
-              <a:t>Scala</a:t>
-            </a:r>
-            <a:endParaRPr lang="en-US" sz="1400" dirty="0">
-              <a:solidFill>
-                <a:srgbClr val="FF0000"/>
-              </a:solidFill>
-            </a:endParaRPr>
-          </a:p>
-        </p:txBody>
-      </p:sp>
-    </p:spTree>
-    <p:extLst>
-      <p:ext uri="{BB962C8B-B14F-4D97-AF65-F5344CB8AC3E}">
-        <p14:creationId xmlns:p14="http://schemas.microsoft.com/office/powerpoint/2010/main" val="1811251889"/>
-      </p:ext>
-    </p:extLst>
-  </p:cSld>
-  <p:clrMapOvr>
-    <a:masterClrMapping/>
-  </p:clrMapOvr>
-  <p:timing>
-    <p:tnLst>
-      <p:par>
-        <p:cTn xmlns:p14="http://schemas.microsoft.com/office/powerpoint/2010/main" id="1" dur="indefinite" restart="never" nodeType="tmRoot"/>
-      </p:par>
-    </p:tnLst>
-  </p:timing>
-</p:sld>
-</file>
-
-<file path=ppt/slides/slide24.xml><?xml version="1.0" encoding="utf-8"?>
-<p:sld xmlns:a="http://schemas.openxmlformats.org/drawingml/2006/main" xmlns:r="http://schemas.openxmlformats.org/officeDocument/2006/relationships" xmlns:p="http://schemas.openxmlformats.org/presentationml/2006/main">
-  <p:cSld>
-    <p:spTree>
-      <p:nvGrpSpPr>
-        <p:cNvPr id="1" name=""/>
-        <p:cNvGrpSpPr/>
-        <p:nvPr/>
-      </p:nvGrpSpPr>
-      <p:grpSpPr>
-        <a:xfrm>
-          <a:off x="0" y="0"/>
-          <a:ext cx="0" cy="0"/>
-          <a:chOff x="0" y="0"/>
-          <a:chExt cx="0" cy="0"/>
-        </a:xfrm>
-      </p:grpSpPr>
-      <p:pic>
-        <p:nvPicPr>
-          <p:cNvPr id="9" name="Picture 8" descr="Screen Shot 2016-02-04 at 3.45.06 PM.png"/>
-          <p:cNvPicPr>
-            <a:picLocks noChangeAspect="1"/>
-          </p:cNvPicPr>
-          <p:nvPr/>
-        </p:nvPicPr>
-        <p:blipFill>
-          <a:blip r:embed="rId2">
-            <a:extLst>
-              <a:ext uri="{28A0092B-C50C-407E-A947-70E740481C1C}">
-                <a14:useLocalDpi xmlns:a14="http://schemas.microsoft.com/office/drawing/2010/main" val="0"/>
-              </a:ext>
-            </a:extLst>
-          </a:blip>
-          <a:stretch>
-            <a:fillRect/>
-          </a:stretch>
-        </p:blipFill>
-        <p:spPr>
-          <a:xfrm>
-            <a:off x="0" y="0"/>
-            <a:ext cx="4514563" cy="5143500"/>
-          </a:xfrm>
-          <a:prstGeom prst="rect">
-            <a:avLst/>
-          </a:prstGeom>
-        </p:spPr>
-      </p:pic>
-      <p:pic>
-        <p:nvPicPr>
-          <p:cNvPr id="11" name="Picture 10" descr="Screen Shot 2016-02-04 at 3.45.44 PM.png"/>
-          <p:cNvPicPr>
-            <a:picLocks noChangeAspect="1"/>
-          </p:cNvPicPr>
-          <p:nvPr/>
-        </p:nvPicPr>
-        <p:blipFill>
-          <a:blip r:embed="rId3">
-            <a:extLst>
-              <a:ext uri="{28A0092B-C50C-407E-A947-70E740481C1C}">
-                <a14:useLocalDpi xmlns:a14="http://schemas.microsoft.com/office/drawing/2010/main" val="0"/>
-              </a:ext>
-            </a:extLst>
-          </a:blip>
-          <a:stretch>
-            <a:fillRect/>
-          </a:stretch>
-        </p:blipFill>
-        <p:spPr>
-          <a:xfrm>
-            <a:off x="4161234" y="0"/>
-            <a:ext cx="4982766" cy="5143500"/>
-          </a:xfrm>
-          <a:prstGeom prst="rect">
-            <a:avLst/>
-          </a:prstGeom>
-        </p:spPr>
-      </p:pic>
-      <p:sp>
-        <p:nvSpPr>
-          <p:cNvPr id="12" name="TextBox 11"/>
-          <p:cNvSpPr txBox="1"/>
-          <p:nvPr/>
-        </p:nvSpPr>
-        <p:spPr>
-          <a:xfrm>
-            <a:off x="8371898" y="33765"/>
-            <a:ext cx="509550" cy="307777"/>
-          </a:xfrm>
-          <a:prstGeom prst="rect">
-            <a:avLst/>
-          </a:prstGeom>
-          <a:noFill/>
-        </p:spPr>
-        <p:txBody>
-          <a:bodyPr wrap="none" rtlCol="0">
-            <a:spAutoFit/>
-          </a:bodyPr>
-          <a:lstStyle/>
-          <a:p>
-            <a:r>
-              <a:rPr lang="en-US" sz="1400" dirty="0" smtClean="0">
-                <a:solidFill>
-                  <a:srgbClr val="FF0000"/>
-                </a:solidFill>
-              </a:rPr>
-              <a:t>Java</a:t>
-            </a:r>
-            <a:endParaRPr lang="en-US" sz="1400" dirty="0">
-              <a:solidFill>
-                <a:srgbClr val="FF0000"/>
-              </a:solidFill>
-            </a:endParaRPr>
-          </a:p>
-        </p:txBody>
-      </p:sp>
-    </p:spTree>
-    <p:extLst>
-      <p:ext uri="{BB962C8B-B14F-4D97-AF65-F5344CB8AC3E}">
-        <p14:creationId xmlns:p14="http://schemas.microsoft.com/office/powerpoint/2010/main" val="2741906039"/>
-      </p:ext>
-    </p:extLst>
-  </p:cSld>
-  <p:clrMapOvr>
-    <a:masterClrMapping/>
-  </p:clrMapOvr>
-  <p:timing>
-    <p:tnLst>
-      <p:par>
-        <p:cTn xmlns:p14="http://schemas.microsoft.com/office/powerpoint/2010/main" id="1" dur="indefinite" restart="never" nodeType="tmRoot"/>
-      </p:par>
-    </p:tnLst>
-  </p:timing>
-</p:sld>
-</file>
-
-<file path=ppt/slides/slide25.xml><?xml version="1.0" encoding="utf-8"?>
-<p:sld xmlns:a="http://schemas.openxmlformats.org/drawingml/2006/main" xmlns:r="http://schemas.openxmlformats.org/officeDocument/2006/relationships" xmlns:p="http://schemas.openxmlformats.org/presentationml/2006/main">
-  <p:cSld>
-    <p:spTree>
-      <p:nvGrpSpPr>
-        <p:cNvPr id="1" name=""/>
-        <p:cNvGrpSpPr/>
-        <p:nvPr/>
-      </p:nvGrpSpPr>
-      <p:grpSpPr>
-        <a:xfrm>
-          <a:off x="0" y="0"/>
-          <a:ext cx="0" cy="0"/>
-          <a:chOff x="0" y="0"/>
-          <a:chExt cx="0" cy="0"/>
-        </a:xfrm>
-      </p:grpSpPr>
-      <p:sp>
-        <p:nvSpPr>
-          <p:cNvPr id="2" name="Title 1"/>
-          <p:cNvSpPr>
-            <a:spLocks noGrp="1"/>
-          </p:cNvSpPr>
-          <p:nvPr>
-            <p:ph type="title"/>
-          </p:nvPr>
-        </p:nvSpPr>
-        <p:spPr/>
-        <p:txBody>
-          <a:bodyPr/>
-          <a:lstStyle/>
-          <a:p>
-            <a:r>
-              <a:rPr lang="en-US" dirty="0" smtClean="0"/>
-              <a:t>Metrics of Shape Models</a:t>
-            </a:r>
-            <a:endParaRPr lang="en-US" dirty="0"/>
-          </a:p>
-        </p:txBody>
-      </p:sp>
-      <p:graphicFrame>
-        <p:nvGraphicFramePr>
-          <p:cNvPr id="6" name="Content Placeholder 5"/>
-          <p:cNvGraphicFramePr>
-            <a:graphicFrameLocks noGrp="1"/>
-          </p:cNvGraphicFramePr>
-          <p:nvPr>
-            <p:ph idx="1"/>
-            <p:extLst>
-              <p:ext uri="{D42A27DB-BD31-4B8C-83A1-F6EECF244321}">
-                <p14:modId xmlns:p14="http://schemas.microsoft.com/office/powerpoint/2010/main" val="2814718542"/>
-              </p:ext>
-            </p:extLst>
-          </p:nvPr>
-        </p:nvGraphicFramePr>
-        <p:xfrm>
-          <a:off x="685800" y="1401763"/>
-          <a:ext cx="7770813" cy="1854200"/>
-        </p:xfrm>
-        <a:graphic>
-          <a:graphicData uri="http://schemas.openxmlformats.org/drawingml/2006/table">
-            <a:tbl>
-              <a:tblPr firstRow="1" bandRow="1">
-                <a:tableStyleId>{5C22544A-7EE6-4342-B048-85BDC9FD1C3A}</a:tableStyleId>
-              </a:tblPr>
-              <a:tblGrid>
-                <a:gridCol w="2590271"/>
-                <a:gridCol w="2590271"/>
-                <a:gridCol w="2590271"/>
-              </a:tblGrid>
-              <a:tr h="370840">
-                <a:tc>
-                  <a:txBody>
-                    <a:bodyPr/>
-                    <a:lstStyle/>
-                    <a:p>
-                      <a:r>
-                        <a:rPr lang="en-US" dirty="0" smtClean="0"/>
-                        <a:t>Language</a:t>
-                      </a:r>
-                      <a:endParaRPr lang="en-US" dirty="0"/>
-                    </a:p>
-                  </a:txBody>
-                  <a:tcPr/>
-                </a:tc>
-                <a:tc>
-                  <a:txBody>
-                    <a:bodyPr/>
-                    <a:lstStyle/>
-                    <a:p>
-                      <a:r>
-                        <a:rPr lang="en-US" dirty="0" smtClean="0"/>
-                        <a:t>Number of Lines</a:t>
-                      </a:r>
-                      <a:endParaRPr lang="en-US" dirty="0"/>
-                    </a:p>
-                  </a:txBody>
-                  <a:tcPr/>
-                </a:tc>
-                <a:tc>
-                  <a:txBody>
-                    <a:bodyPr/>
-                    <a:lstStyle/>
-                    <a:p>
-                      <a:r>
-                        <a:rPr lang="en-US" dirty="0" smtClean="0"/>
-                        <a:t>Number</a:t>
-                      </a:r>
-                      <a:r>
-                        <a:rPr lang="en-US" baseline="0" dirty="0" smtClean="0"/>
-                        <a:t> of Characters</a:t>
-                      </a:r>
-                      <a:endParaRPr lang="en-US" dirty="0"/>
-                    </a:p>
-                  </a:txBody>
-                  <a:tcPr/>
-                </a:tc>
-              </a:tr>
-              <a:tr h="370840">
-                <a:tc>
-                  <a:txBody>
-                    <a:bodyPr/>
-                    <a:lstStyle/>
-                    <a:p>
-                      <a:r>
-                        <a:rPr lang="en-US" b="1" dirty="0" smtClean="0">
-                          <a:solidFill>
-                            <a:srgbClr val="FF0000"/>
-                          </a:solidFill>
-                        </a:rPr>
-                        <a:t>K</a:t>
-                      </a:r>
-                      <a:endParaRPr lang="en-US" b="1" dirty="0">
-                        <a:solidFill>
-                          <a:srgbClr val="FF0000"/>
-                        </a:solidFill>
-                      </a:endParaRPr>
-                    </a:p>
-                  </a:txBody>
-                  <a:tcPr/>
-                </a:tc>
-                <a:tc>
-                  <a:txBody>
-                    <a:bodyPr/>
-                    <a:lstStyle/>
-                    <a:p>
-                      <a:r>
-                        <a:rPr lang="en-US" dirty="0" smtClean="0"/>
-                        <a:t>44</a:t>
-                      </a:r>
-                      <a:endParaRPr lang="en-US" dirty="0"/>
-                    </a:p>
-                  </a:txBody>
-                  <a:tcPr/>
-                </a:tc>
-                <a:tc>
-                  <a:txBody>
-                    <a:bodyPr/>
-                    <a:lstStyle/>
-                    <a:p>
-                      <a:r>
-                        <a:rPr lang="en-US" dirty="0" smtClean="0"/>
-                        <a:t>649</a:t>
-                      </a:r>
-                      <a:endParaRPr lang="en-US" dirty="0"/>
-                    </a:p>
-                  </a:txBody>
-                  <a:tcPr/>
-                </a:tc>
-              </a:tr>
-              <a:tr h="370840">
-                <a:tc>
-                  <a:txBody>
-                    <a:bodyPr/>
-                    <a:lstStyle/>
-                    <a:p>
-                      <a:r>
-                        <a:rPr lang="en-US" b="1" dirty="0" smtClean="0">
-                          <a:solidFill>
-                            <a:srgbClr val="FF0000"/>
-                          </a:solidFill>
-                        </a:rPr>
-                        <a:t>Scala</a:t>
-                      </a:r>
-                      <a:endParaRPr lang="en-US" b="1" dirty="0">
-                        <a:solidFill>
-                          <a:srgbClr val="FF0000"/>
-                        </a:solidFill>
-                      </a:endParaRPr>
-                    </a:p>
-                  </a:txBody>
-                  <a:tcPr/>
-                </a:tc>
-                <a:tc>
-                  <a:txBody>
-                    <a:bodyPr/>
-                    <a:lstStyle/>
-                    <a:p>
-                      <a:r>
-                        <a:rPr lang="en-US" dirty="0" smtClean="0"/>
-                        <a:t>44</a:t>
-                      </a:r>
-                      <a:endParaRPr lang="en-US" dirty="0"/>
-                    </a:p>
-                  </a:txBody>
-                  <a:tcPr/>
-                </a:tc>
-                <a:tc>
-                  <a:txBody>
-                    <a:bodyPr/>
-                    <a:lstStyle/>
-                    <a:p>
-                      <a:r>
-                        <a:rPr lang="en-US" dirty="0" smtClean="0"/>
-                        <a:t>714</a:t>
-                      </a:r>
-                      <a:endParaRPr lang="en-US" dirty="0"/>
-                    </a:p>
-                  </a:txBody>
-                  <a:tcPr/>
-                </a:tc>
-              </a:tr>
-              <a:tr h="370840">
-                <a:tc>
-                  <a:txBody>
-                    <a:bodyPr/>
-                    <a:lstStyle/>
-                    <a:p>
-                      <a:r>
-                        <a:rPr lang="en-US" b="1" dirty="0" smtClean="0">
-                          <a:solidFill>
-                            <a:srgbClr val="FF0000"/>
-                          </a:solidFill>
-                        </a:rPr>
-                        <a:t>Java</a:t>
-                      </a:r>
-                      <a:endParaRPr lang="en-US" b="1" dirty="0">
-                        <a:solidFill>
-                          <a:srgbClr val="FF0000"/>
-                        </a:solidFill>
-                      </a:endParaRPr>
-                    </a:p>
-                  </a:txBody>
-                  <a:tcPr/>
-                </a:tc>
-                <a:tc>
-                  <a:txBody>
-                    <a:bodyPr/>
-                    <a:lstStyle/>
-                    <a:p>
-                      <a:r>
-                        <a:rPr lang="en-US" b="1" dirty="0" smtClean="0">
-                          <a:solidFill>
-                            <a:schemeClr val="accent4"/>
-                          </a:solidFill>
-                        </a:rPr>
-                        <a:t>54</a:t>
-                      </a:r>
-                      <a:endParaRPr lang="en-US" b="1" dirty="0">
-                        <a:solidFill>
-                          <a:schemeClr val="accent4"/>
-                        </a:solidFill>
-                      </a:endParaRPr>
-                    </a:p>
-                  </a:txBody>
-                  <a:tcPr/>
-                </a:tc>
-                <a:tc>
-                  <a:txBody>
-                    <a:bodyPr/>
-                    <a:lstStyle/>
-                    <a:p>
-                      <a:r>
-                        <a:rPr lang="en-US" dirty="0" smtClean="0"/>
-                        <a:t>826</a:t>
-                      </a:r>
-                      <a:endParaRPr lang="en-US" dirty="0"/>
-                    </a:p>
-                  </a:txBody>
-                  <a:tcPr/>
-                </a:tc>
-              </a:tr>
-              <a:tr h="370840">
-                <a:tc>
-                  <a:txBody>
-                    <a:bodyPr/>
-                    <a:lstStyle/>
-                    <a:p>
-                      <a:r>
-                        <a:rPr lang="en-US" b="1" dirty="0" smtClean="0">
-                          <a:solidFill>
-                            <a:srgbClr val="FF0000"/>
-                          </a:solidFill>
-                        </a:rPr>
-                        <a:t>OCLInEcore</a:t>
-                      </a:r>
-                      <a:endParaRPr lang="en-US" b="1" dirty="0">
-                        <a:solidFill>
-                          <a:srgbClr val="FF0000"/>
-                        </a:solidFill>
-                      </a:endParaRPr>
-                    </a:p>
-                  </a:txBody>
-                  <a:tcPr/>
-                </a:tc>
-                <a:tc>
-                  <a:txBody>
-                    <a:bodyPr/>
-                    <a:lstStyle/>
-                    <a:p>
-                      <a:r>
-                        <a:rPr lang="en-US" dirty="0" smtClean="0"/>
-                        <a:t>45</a:t>
-                      </a:r>
-                      <a:endParaRPr lang="en-US" dirty="0"/>
-                    </a:p>
-                  </a:txBody>
-                  <a:tcPr/>
-                </a:tc>
-                <a:tc>
-                  <a:txBody>
-                    <a:bodyPr/>
-                    <a:lstStyle/>
-                    <a:p>
-                      <a:r>
-                        <a:rPr lang="en-US" b="1" dirty="0" smtClean="0">
-                          <a:solidFill>
-                            <a:srgbClr val="E8950E"/>
-                          </a:solidFill>
-                        </a:rPr>
-                        <a:t>899</a:t>
-                      </a:r>
-                      <a:endParaRPr lang="en-US" b="1" dirty="0">
-                        <a:solidFill>
-                          <a:srgbClr val="E8950E"/>
-                        </a:solidFill>
-                      </a:endParaRPr>
-                    </a:p>
-                  </a:txBody>
-                  <a:tcPr/>
-                </a:tc>
-              </a:tr>
-            </a:tbl>
-          </a:graphicData>
-        </a:graphic>
-      </p:graphicFrame>
-      <p:sp>
-        <p:nvSpPr>
-          <p:cNvPr id="7" name="TextBox 6"/>
-          <p:cNvSpPr txBox="1"/>
-          <p:nvPr/>
-        </p:nvSpPr>
-        <p:spPr>
-          <a:xfrm>
-            <a:off x="2237153" y="3927231"/>
-            <a:ext cx="6173485" cy="646331"/>
-          </a:xfrm>
-          <a:prstGeom prst="rect">
-            <a:avLst/>
-          </a:prstGeom>
-          <a:noFill/>
-        </p:spPr>
-        <p:txBody>
-          <a:bodyPr wrap="none" rtlCol="0">
-            <a:spAutoFit/>
-          </a:bodyPr>
-          <a:lstStyle/>
-          <a:p>
-            <a:r>
-              <a:rPr lang="en-US" dirty="0" smtClean="0"/>
-              <a:t>Edited to use </a:t>
-            </a:r>
-            <a:r>
-              <a:rPr lang="en-US" dirty="0" smtClean="0"/>
-              <a:t>same spacing, </a:t>
-            </a:r>
-            <a:r>
-              <a:rPr lang="en-US" dirty="0" smtClean="0"/>
-              <a:t>names and use same keyword for</a:t>
-            </a:r>
-          </a:p>
-          <a:p>
-            <a:r>
-              <a:rPr lang="en-US" dirty="0"/>
-              <a:t>r</a:t>
-            </a:r>
-            <a:r>
-              <a:rPr lang="en-US" dirty="0" smtClean="0"/>
-              <a:t>equirements: </a:t>
-            </a:r>
-            <a:r>
-              <a:rPr lang="en-US" dirty="0" smtClean="0"/>
-              <a:t>(‘</a:t>
-            </a:r>
-            <a:r>
-              <a:rPr lang="en-US" dirty="0" smtClean="0"/>
-              <a:t>invariant’ </a:t>
-            </a:r>
-            <a:r>
-              <a:rPr lang="en-US" dirty="0" smtClean="0"/>
-              <a:t>instead </a:t>
-            </a:r>
-            <a:r>
-              <a:rPr lang="en-US" dirty="0" smtClean="0"/>
-              <a:t>of ‘</a:t>
-            </a:r>
-            <a:r>
-              <a:rPr lang="en-US" dirty="0" err="1" smtClean="0"/>
-              <a:t>req</a:t>
-            </a:r>
-            <a:r>
-              <a:rPr lang="en-US" dirty="0" smtClean="0"/>
-              <a:t>’ in </a:t>
-            </a:r>
-            <a:r>
-              <a:rPr lang="en-US" dirty="0" smtClean="0"/>
-              <a:t>K to be fair)</a:t>
-            </a:r>
-            <a:r>
-              <a:rPr lang="en-US" dirty="0" smtClean="0"/>
-              <a:t>.</a:t>
-            </a:r>
-            <a:endParaRPr lang="en-US" dirty="0"/>
-          </a:p>
-        </p:txBody>
-      </p:sp>
-    </p:spTree>
-    <p:extLst>
-      <p:ext uri="{BB962C8B-B14F-4D97-AF65-F5344CB8AC3E}">
-        <p14:creationId xmlns:p14="http://schemas.microsoft.com/office/powerpoint/2010/main" val="1145423269"/>
-      </p:ext>
-    </p:extLst>
-  </p:cSld>
-  <p:clrMapOvr>
-    <a:masterClrMapping/>
-  </p:clrMapOvr>
-  <p:timing>
-    <p:tnLst>
-      <p:par>
-        <p:cTn xmlns:p14="http://schemas.microsoft.com/office/powerpoint/2010/main" id="1" dur="indefinite" restart="never" nodeType="tmRoot"/>
-      </p:par>
-    </p:tnLst>
-  </p:timing>
-</p:sld>
-</file>
-
-<file path=ppt/slides/slide26.xml><?xml version="1.0" encoding="utf-8"?>
-<p:sld xmlns:a="http://schemas.openxmlformats.org/drawingml/2006/main" xmlns:r="http://schemas.openxmlformats.org/officeDocument/2006/relationships" xmlns:p="http://schemas.openxmlformats.org/presentationml/2006/main">
-  <p:cSld>
-    <p:spTree>
-      <p:nvGrpSpPr>
-        <p:cNvPr id="1" name=""/>
-        <p:cNvGrpSpPr/>
-        <p:nvPr/>
-      </p:nvGrpSpPr>
-      <p:grpSpPr>
-        <a:xfrm>
-          <a:off x="0" y="0"/>
-          <a:ext cx="0" cy="0"/>
-          <a:chOff x="0" y="0"/>
-          <a:chExt cx="0" cy="0"/>
-        </a:xfrm>
-      </p:grpSpPr>
-      <p:sp>
-        <p:nvSpPr>
-          <p:cNvPr id="4" name="Title 3"/>
-          <p:cNvSpPr>
-            <a:spLocks noGrp="1"/>
-          </p:cNvSpPr>
-          <p:nvPr>
-            <p:ph type="title"/>
-          </p:nvPr>
-        </p:nvSpPr>
-        <p:spPr/>
-        <p:txBody>
-          <a:bodyPr/>
-          <a:lstStyle/>
-          <a:p>
-            <a:r>
-              <a:rPr lang="en-US" dirty="0" smtClean="0"/>
-              <a:t>In a Graph</a:t>
-            </a:r>
-            <a:endParaRPr lang="en-US" dirty="0"/>
-          </a:p>
-        </p:txBody>
-      </p:sp>
-      <p:graphicFrame>
-        <p:nvGraphicFramePr>
-          <p:cNvPr id="5" name="Chart 4"/>
-          <p:cNvGraphicFramePr>
-            <a:graphicFrameLocks/>
-          </p:cNvGraphicFramePr>
-          <p:nvPr>
-            <p:extLst>
-              <p:ext uri="{D42A27DB-BD31-4B8C-83A1-F6EECF244321}">
-                <p14:modId xmlns:p14="http://schemas.microsoft.com/office/powerpoint/2010/main" val="3166444322"/>
-              </p:ext>
-            </p:extLst>
-          </p:nvPr>
-        </p:nvGraphicFramePr>
-        <p:xfrm>
-          <a:off x="2448327" y="1830405"/>
-          <a:ext cx="4572000" cy="2743200"/>
-        </p:xfrm>
-        <a:graphic>
-          <a:graphicData uri="http://schemas.openxmlformats.org/drawingml/2006/chart">
-            <c:chart xmlns:c="http://schemas.openxmlformats.org/drawingml/2006/chart" xmlns:r="http://schemas.openxmlformats.org/officeDocument/2006/relationships" r:id="rId2"/>
-          </a:graphicData>
-        </a:graphic>
-      </p:graphicFrame>
-    </p:spTree>
-    <p:extLst>
-      <p:ext uri="{BB962C8B-B14F-4D97-AF65-F5344CB8AC3E}">
-        <p14:creationId xmlns:p14="http://schemas.microsoft.com/office/powerpoint/2010/main" val="3786215379"/>
-      </p:ext>
-    </p:extLst>
-  </p:cSld>
-  <p:clrMapOvr>
-    <a:masterClrMapping/>
-  </p:clrMapOvr>
-  <p:timing>
-    <p:tnLst>
-      <p:par>
-        <p:cTn xmlns:p14="http://schemas.microsoft.com/office/powerpoint/2010/main" id="1" dur="indefinite" restart="never" nodeType="tmRoot"/>
-      </p:par>
-    </p:tnLst>
-  </p:timing>
-</p:sld>
-</file>
-
-<file path=ppt/slides/slide27.xml><?xml version="1.0" encoding="utf-8"?>
-<p:sld xmlns:a="http://schemas.openxmlformats.org/drawingml/2006/main" xmlns:r="http://schemas.openxmlformats.org/officeDocument/2006/relationships" xmlns:p="http://schemas.openxmlformats.org/presentationml/2006/main">
-  <p:cSld>
-    <p:spTree>
-      <p:nvGrpSpPr>
-        <p:cNvPr id="1" name=""/>
-        <p:cNvGrpSpPr/>
-        <p:nvPr/>
-      </p:nvGrpSpPr>
-      <p:grpSpPr>
-        <a:xfrm>
-          <a:off x="0" y="0"/>
-          <a:ext cx="0" cy="0"/>
-          <a:chOff x="0" y="0"/>
-          <a:chExt cx="0" cy="0"/>
-        </a:xfrm>
-      </p:grpSpPr>
-      <p:sp>
-        <p:nvSpPr>
-          <p:cNvPr id="4" name="Title 3"/>
-          <p:cNvSpPr>
-            <a:spLocks noGrp="1"/>
-          </p:cNvSpPr>
-          <p:nvPr>
-            <p:ph type="title"/>
-          </p:nvPr>
-        </p:nvSpPr>
-        <p:spPr/>
-        <p:txBody>
-          <a:bodyPr/>
-          <a:lstStyle/>
-          <a:p>
-            <a:r>
-              <a:rPr lang="en-US" dirty="0" smtClean="0"/>
-              <a:t>The Library Model</a:t>
-            </a:r>
-            <a:endParaRPr lang="en-US" dirty="0"/>
-          </a:p>
-        </p:txBody>
-      </p:sp>
-      <p:sp>
-        <p:nvSpPr>
-          <p:cNvPr id="5" name="Text Placeholder 4"/>
-          <p:cNvSpPr>
-            <a:spLocks noGrp="1"/>
-          </p:cNvSpPr>
-          <p:nvPr>
-            <p:ph type="body" idx="1"/>
-          </p:nvPr>
-        </p:nvSpPr>
-        <p:spPr>
-          <a:xfrm>
-            <a:off x="458335" y="2067486"/>
-            <a:ext cx="7998280" cy="1494409"/>
-          </a:xfrm>
-        </p:spPr>
-        <p:txBody>
-          <a:bodyPr>
-            <a:normAutofit/>
-          </a:bodyPr>
-          <a:lstStyle/>
-          <a:p>
-            <a:endParaRPr lang="en-US" dirty="0" smtClean="0"/>
-          </a:p>
-          <a:p>
-            <a:r>
-              <a:rPr lang="en-US" dirty="0" smtClean="0">
-                <a:solidFill>
-                  <a:srgbClr val="FF0000"/>
-                </a:solidFill>
-              </a:rPr>
-              <a:t>K</a:t>
-            </a:r>
-          </a:p>
-          <a:p>
-            <a:r>
-              <a:rPr lang="en-US" dirty="0" smtClean="0">
-                <a:solidFill>
-                  <a:srgbClr val="FF0000"/>
-                </a:solidFill>
-              </a:rPr>
-              <a:t>OCLInEcore</a:t>
-            </a:r>
-          </a:p>
-          <a:p>
-            <a:r>
-              <a:rPr lang="en-US" dirty="0" smtClean="0">
-                <a:solidFill>
-                  <a:srgbClr val="FF0000"/>
-                </a:solidFill>
-              </a:rPr>
-              <a:t>Scala</a:t>
-            </a:r>
-            <a:endParaRPr lang="en-US" dirty="0">
-              <a:solidFill>
-                <a:srgbClr val="FF0000"/>
-              </a:solidFill>
-            </a:endParaRPr>
-          </a:p>
-        </p:txBody>
-      </p:sp>
-      <p:sp>
-        <p:nvSpPr>
-          <p:cNvPr id="6" name="TextBox 5"/>
-          <p:cNvSpPr txBox="1"/>
-          <p:nvPr/>
-        </p:nvSpPr>
-        <p:spPr>
-          <a:xfrm>
-            <a:off x="1852433" y="3759202"/>
-            <a:ext cx="5492572" cy="923330"/>
-          </a:xfrm>
-          <a:prstGeom prst="rect">
-            <a:avLst/>
-          </a:prstGeom>
-          <a:noFill/>
-        </p:spPr>
-        <p:txBody>
-          <a:bodyPr wrap="none" rtlCol="0">
-            <a:spAutoFit/>
-          </a:bodyPr>
-          <a:lstStyle/>
-          <a:p>
-            <a:r>
-              <a:rPr lang="en-US" dirty="0" smtClean="0">
-                <a:solidFill>
-                  <a:srgbClr val="FFFF00"/>
-                </a:solidFill>
-              </a:rPr>
-              <a:t>Demonstrates richer OCL expressions in OCLInEcore</a:t>
-            </a:r>
-          </a:p>
-          <a:p>
-            <a:r>
-              <a:rPr lang="en-US" dirty="0">
-                <a:solidFill>
-                  <a:srgbClr val="FFFF00"/>
-                </a:solidFill>
-              </a:rPr>
-              <a:t>c</a:t>
-            </a:r>
-            <a:r>
-              <a:rPr lang="en-US" dirty="0" smtClean="0">
-                <a:solidFill>
-                  <a:srgbClr val="FFFF00"/>
-                </a:solidFill>
-              </a:rPr>
-              <a:t>orresponding to Set/Bag comprehensions in K.</a:t>
-            </a:r>
-          </a:p>
-          <a:p>
-            <a:r>
-              <a:rPr lang="en-US" dirty="0" smtClean="0">
-                <a:solidFill>
-                  <a:srgbClr val="FFFF00"/>
-                </a:solidFill>
-              </a:rPr>
-              <a:t>Scala supports OCL-like notation (very similar).</a:t>
-            </a:r>
-            <a:endParaRPr lang="en-US" dirty="0">
-              <a:solidFill>
-                <a:srgbClr val="FFFF00"/>
-              </a:solidFill>
-            </a:endParaRPr>
-          </a:p>
-        </p:txBody>
-      </p:sp>
-    </p:spTree>
-    <p:extLst>
-      <p:ext uri="{BB962C8B-B14F-4D97-AF65-F5344CB8AC3E}">
-        <p14:creationId xmlns:p14="http://schemas.microsoft.com/office/powerpoint/2010/main" val="2286808265"/>
-      </p:ext>
-    </p:extLst>
-  </p:cSld>
-  <p:clrMapOvr>
-    <a:masterClrMapping/>
-  </p:clrMapOvr>
-  <p:timing>
-    <p:tnLst>
-      <p:par>
-        <p:cTn xmlns:p14="http://schemas.microsoft.com/office/powerpoint/2010/main" id="1" dur="indefinite" restart="never" nodeType="tmRoot"/>
-      </p:par>
-    </p:tnLst>
-  </p:timing>
-</p:sld>
-</file>
-
-<file path=ppt/slides/slide28.xml><?xml version="1.0" encoding="utf-8"?>
 <p:sld xmlns:a="http://schemas.openxmlformats.org/drawingml/2006/main" xmlns:r="http://schemas.openxmlformats.org/officeDocument/2006/relationships" xmlns:p="http://schemas.openxmlformats.org/presentationml/2006/main">
   <p:cSld>
     <p:spTree>
@@ -8996,7 +8051,7 @@
     </p:spTree>
     <p:extLst>
       <p:ext uri="{BB962C8B-B14F-4D97-AF65-F5344CB8AC3E}">
-        <p14:creationId xmlns:p14="http://schemas.microsoft.com/office/powerpoint/2010/main" val="1199946808"/>
+        <p14:creationId xmlns:p14="http://schemas.microsoft.com/office/powerpoint/2010/main" val="1334996421"/>
       </p:ext>
     </p:extLst>
   </p:cSld>
@@ -9013,7 +8068,7 @@
 </p:sld>
 </file>
 
-<file path=ppt/slides/slide29.xml><?xml version="1.0" encoding="utf-8"?>
+<file path=ppt/slides/slide24.xml><?xml version="1.0" encoding="utf-8"?>
 <p:sld xmlns:a="http://schemas.openxmlformats.org/drawingml/2006/main" xmlns:r="http://schemas.openxmlformats.org/officeDocument/2006/relationships" xmlns:p="http://schemas.openxmlformats.org/presentationml/2006/main">
   <p:cSld>
     <p:spTree>
@@ -9285,7 +8340,1013 @@
     </p:spTree>
     <p:extLst>
       <p:ext uri="{BB962C8B-B14F-4D97-AF65-F5344CB8AC3E}">
-        <p14:creationId xmlns:p14="http://schemas.microsoft.com/office/powerpoint/2010/main" val="811060454"/>
+        <p14:creationId xmlns:p14="http://schemas.microsoft.com/office/powerpoint/2010/main" val="648689772"/>
+      </p:ext>
+    </p:extLst>
+  </p:cSld>
+  <p:clrMapOvr>
+    <a:masterClrMapping/>
+  </p:clrMapOvr>
+  <p:timing>
+    <p:tnLst>
+      <p:par>
+        <p:cTn xmlns:p14="http://schemas.microsoft.com/office/powerpoint/2010/main" id="1" dur="indefinite" restart="never" nodeType="tmRoot"/>
+      </p:par>
+    </p:tnLst>
+  </p:timing>
+</p:sld>
+</file>
+
+<file path=ppt/slides/slide25.xml><?xml version="1.0" encoding="utf-8"?>
+<p:sld xmlns:a="http://schemas.openxmlformats.org/drawingml/2006/main" xmlns:r="http://schemas.openxmlformats.org/officeDocument/2006/relationships" xmlns:p="http://schemas.openxmlformats.org/presentationml/2006/main">
+  <p:cSld>
+    <p:spTree>
+      <p:nvGrpSpPr>
+        <p:cNvPr id="1" name=""/>
+        <p:cNvGrpSpPr/>
+        <p:nvPr/>
+      </p:nvGrpSpPr>
+      <p:grpSpPr>
+        <a:xfrm>
+          <a:off x="0" y="0"/>
+          <a:ext cx="0" cy="0"/>
+          <a:chOff x="0" y="0"/>
+          <a:chExt cx="0" cy="0"/>
+        </a:xfrm>
+      </p:grpSpPr>
+      <p:sp>
+        <p:nvSpPr>
+          <p:cNvPr id="4" name="Title 3"/>
+          <p:cNvSpPr>
+            <a:spLocks noGrp="1"/>
+          </p:cNvSpPr>
+          <p:nvPr>
+            <p:ph type="title"/>
+          </p:nvPr>
+        </p:nvSpPr>
+        <p:spPr/>
+        <p:txBody>
+          <a:bodyPr/>
+          <a:lstStyle/>
+          <a:p>
+            <a:r>
+              <a:rPr lang="en-US" dirty="0" smtClean="0"/>
+              <a:t>The Shapes Model</a:t>
+            </a:r>
+            <a:endParaRPr lang="en-US" dirty="0"/>
+          </a:p>
+        </p:txBody>
+      </p:sp>
+      <p:sp>
+        <p:nvSpPr>
+          <p:cNvPr id="6" name="Text Placeholder 4"/>
+          <p:cNvSpPr>
+            <a:spLocks noGrp="1"/>
+          </p:cNvSpPr>
+          <p:nvPr>
+            <p:ph type="body" idx="1"/>
+          </p:nvPr>
+        </p:nvSpPr>
+        <p:spPr>
+          <a:xfrm>
+            <a:off x="458335" y="2067486"/>
+            <a:ext cx="7998280" cy="1494409"/>
+          </a:xfrm>
+        </p:spPr>
+        <p:txBody>
+          <a:bodyPr>
+            <a:normAutofit fontScale="92500" lnSpcReduction="20000"/>
+          </a:bodyPr>
+          <a:lstStyle/>
+          <a:p>
+            <a:endParaRPr lang="en-US" dirty="0" smtClean="0"/>
+          </a:p>
+          <a:p>
+            <a:r>
+              <a:rPr lang="en-US" dirty="0" smtClean="0">
+                <a:solidFill>
+                  <a:srgbClr val="FF0000"/>
+                </a:solidFill>
+              </a:rPr>
+              <a:t>K</a:t>
+            </a:r>
+          </a:p>
+          <a:p>
+            <a:r>
+              <a:rPr lang="en-US" dirty="0" smtClean="0">
+                <a:solidFill>
+                  <a:srgbClr val="FF0000"/>
+                </a:solidFill>
+              </a:rPr>
+              <a:t>OCLInEcore</a:t>
+            </a:r>
+          </a:p>
+          <a:p>
+            <a:r>
+              <a:rPr lang="en-US" dirty="0" smtClean="0">
+                <a:solidFill>
+                  <a:srgbClr val="FF0000"/>
+                </a:solidFill>
+              </a:rPr>
+              <a:t>Scala</a:t>
+            </a:r>
+          </a:p>
+          <a:p>
+            <a:r>
+              <a:rPr lang="en-US" dirty="0" smtClean="0">
+                <a:solidFill>
+                  <a:srgbClr val="FF0000"/>
+                </a:solidFill>
+              </a:rPr>
+              <a:t>Java</a:t>
+            </a:r>
+            <a:endParaRPr lang="en-US" dirty="0">
+              <a:solidFill>
+                <a:srgbClr val="FF0000"/>
+              </a:solidFill>
+            </a:endParaRPr>
+          </a:p>
+        </p:txBody>
+      </p:sp>
+    </p:spTree>
+    <p:extLst>
+      <p:ext uri="{BB962C8B-B14F-4D97-AF65-F5344CB8AC3E}">
+        <p14:creationId xmlns:p14="http://schemas.microsoft.com/office/powerpoint/2010/main" val="3202098064"/>
+      </p:ext>
+    </p:extLst>
+  </p:cSld>
+  <p:clrMapOvr>
+    <a:masterClrMapping/>
+  </p:clrMapOvr>
+  <p:timing>
+    <p:tnLst>
+      <p:par>
+        <p:cTn xmlns:p14="http://schemas.microsoft.com/office/powerpoint/2010/main" id="1" dur="indefinite" restart="never" nodeType="tmRoot"/>
+      </p:par>
+    </p:tnLst>
+  </p:timing>
+</p:sld>
+</file>
+
+<file path=ppt/slides/slide26.xml><?xml version="1.0" encoding="utf-8"?>
+<p:sld xmlns:a="http://schemas.openxmlformats.org/drawingml/2006/main" xmlns:r="http://schemas.openxmlformats.org/officeDocument/2006/relationships" xmlns:p="http://schemas.openxmlformats.org/presentationml/2006/main">
+  <p:cSld>
+    <p:spTree>
+      <p:nvGrpSpPr>
+        <p:cNvPr id="1" name=""/>
+        <p:cNvGrpSpPr/>
+        <p:nvPr/>
+      </p:nvGrpSpPr>
+      <p:grpSpPr>
+        <a:xfrm>
+          <a:off x="0" y="0"/>
+          <a:ext cx="0" cy="0"/>
+          <a:chOff x="0" y="0"/>
+          <a:chExt cx="0" cy="0"/>
+        </a:xfrm>
+      </p:grpSpPr>
+      <p:pic>
+        <p:nvPicPr>
+          <p:cNvPr id="6" name="Picture 5" descr="Screen Shot 2016-02-04 at 2.35.49 PM.png"/>
+          <p:cNvPicPr>
+            <a:picLocks noChangeAspect="1"/>
+          </p:cNvPicPr>
+          <p:nvPr/>
+        </p:nvPicPr>
+        <p:blipFill>
+          <a:blip r:embed="rId2">
+            <a:extLst>
+              <a:ext uri="{28A0092B-C50C-407E-A947-70E740481C1C}">
+                <a14:useLocalDpi xmlns:a14="http://schemas.microsoft.com/office/drawing/2010/main" val="0"/>
+              </a:ext>
+            </a:extLst>
+          </a:blip>
+          <a:stretch>
+            <a:fillRect/>
+          </a:stretch>
+        </p:blipFill>
+        <p:spPr>
+          <a:xfrm>
+            <a:off x="0" y="0"/>
+            <a:ext cx="2877877" cy="5143500"/>
+          </a:xfrm>
+          <a:prstGeom prst="rect">
+            <a:avLst/>
+          </a:prstGeom>
+        </p:spPr>
+      </p:pic>
+      <p:pic>
+        <p:nvPicPr>
+          <p:cNvPr id="7" name="Picture 6" descr="Screen Shot 2016-02-04 at 2.36.19 PM.png"/>
+          <p:cNvPicPr>
+            <a:picLocks noChangeAspect="1"/>
+          </p:cNvPicPr>
+          <p:nvPr/>
+        </p:nvPicPr>
+        <p:blipFill>
+          <a:blip r:embed="rId3">
+            <a:extLst>
+              <a:ext uri="{28A0092B-C50C-407E-A947-70E740481C1C}">
+                <a14:useLocalDpi xmlns:a14="http://schemas.microsoft.com/office/drawing/2010/main" val="0"/>
+              </a:ext>
+            </a:extLst>
+          </a:blip>
+          <a:stretch>
+            <a:fillRect/>
+          </a:stretch>
+        </p:blipFill>
+        <p:spPr>
+          <a:xfrm>
+            <a:off x="2877877" y="0"/>
+            <a:ext cx="3573249" cy="5143500"/>
+          </a:xfrm>
+          <a:prstGeom prst="rect">
+            <a:avLst/>
+          </a:prstGeom>
+        </p:spPr>
+      </p:pic>
+      <p:pic>
+        <p:nvPicPr>
+          <p:cNvPr id="9" name="Picture 8"/>
+          <p:cNvPicPr>
+            <a:picLocks noChangeAspect="1"/>
+          </p:cNvPicPr>
+          <p:nvPr/>
+        </p:nvPicPr>
+        <p:blipFill>
+          <a:blip r:embed="rId4"/>
+          <a:stretch>
+            <a:fillRect/>
+          </a:stretch>
+        </p:blipFill>
+        <p:spPr>
+          <a:xfrm>
+            <a:off x="6357048" y="0"/>
+            <a:ext cx="2891070" cy="5143500"/>
+          </a:xfrm>
+          <a:prstGeom prst="rect">
+            <a:avLst/>
+          </a:prstGeom>
+        </p:spPr>
+      </p:pic>
+      <p:sp>
+        <p:nvSpPr>
+          <p:cNvPr id="10" name="TextBox 9"/>
+          <p:cNvSpPr txBox="1"/>
+          <p:nvPr/>
+        </p:nvSpPr>
+        <p:spPr>
+          <a:xfrm>
+            <a:off x="2240626" y="43657"/>
+            <a:ext cx="325730" cy="307777"/>
+          </a:xfrm>
+          <a:prstGeom prst="rect">
+            <a:avLst/>
+          </a:prstGeom>
+          <a:noFill/>
+        </p:spPr>
+        <p:txBody>
+          <a:bodyPr wrap="none" rtlCol="0">
+            <a:spAutoFit/>
+          </a:bodyPr>
+          <a:lstStyle/>
+          <a:p>
+            <a:r>
+              <a:rPr lang="en-US" sz="1400" dirty="0">
+                <a:solidFill>
+                  <a:srgbClr val="FF0000"/>
+                </a:solidFill>
+              </a:rPr>
+              <a:t>K</a:t>
+            </a:r>
+          </a:p>
+        </p:txBody>
+      </p:sp>
+      <p:sp>
+        <p:nvSpPr>
+          <p:cNvPr id="11" name="TextBox 10"/>
+          <p:cNvSpPr txBox="1"/>
+          <p:nvPr/>
+        </p:nvSpPr>
+        <p:spPr>
+          <a:xfrm>
+            <a:off x="5011458" y="62306"/>
+            <a:ext cx="1181671" cy="307777"/>
+          </a:xfrm>
+          <a:prstGeom prst="rect">
+            <a:avLst/>
+          </a:prstGeom>
+          <a:noFill/>
+        </p:spPr>
+        <p:txBody>
+          <a:bodyPr wrap="none" rtlCol="0">
+            <a:spAutoFit/>
+          </a:bodyPr>
+          <a:lstStyle/>
+          <a:p>
+            <a:r>
+              <a:rPr lang="en-US" sz="1400" dirty="0" smtClean="0">
+                <a:solidFill>
+                  <a:srgbClr val="FF0000"/>
+                </a:solidFill>
+              </a:rPr>
+              <a:t>OCLInEcore</a:t>
+            </a:r>
+            <a:endParaRPr lang="en-US" sz="1400" dirty="0">
+              <a:solidFill>
+                <a:srgbClr val="FF0000"/>
+              </a:solidFill>
+            </a:endParaRPr>
+          </a:p>
+        </p:txBody>
+      </p:sp>
+      <p:sp>
+        <p:nvSpPr>
+          <p:cNvPr id="12" name="TextBox 11"/>
+          <p:cNvSpPr txBox="1"/>
+          <p:nvPr/>
+        </p:nvSpPr>
+        <p:spPr>
+          <a:xfrm>
+            <a:off x="8371898" y="33765"/>
+            <a:ext cx="595035" cy="307777"/>
+          </a:xfrm>
+          <a:prstGeom prst="rect">
+            <a:avLst/>
+          </a:prstGeom>
+          <a:noFill/>
+        </p:spPr>
+        <p:txBody>
+          <a:bodyPr wrap="none" rtlCol="0">
+            <a:spAutoFit/>
+          </a:bodyPr>
+          <a:lstStyle/>
+          <a:p>
+            <a:r>
+              <a:rPr lang="en-US" sz="1400" dirty="0" smtClean="0">
+                <a:solidFill>
+                  <a:srgbClr val="FF0000"/>
+                </a:solidFill>
+              </a:rPr>
+              <a:t>Scala</a:t>
+            </a:r>
+            <a:endParaRPr lang="en-US" sz="1400" dirty="0">
+              <a:solidFill>
+                <a:srgbClr val="FF0000"/>
+              </a:solidFill>
+            </a:endParaRPr>
+          </a:p>
+        </p:txBody>
+      </p:sp>
+    </p:spTree>
+    <p:extLst>
+      <p:ext uri="{BB962C8B-B14F-4D97-AF65-F5344CB8AC3E}">
+        <p14:creationId xmlns:p14="http://schemas.microsoft.com/office/powerpoint/2010/main" val="1811251889"/>
+      </p:ext>
+    </p:extLst>
+  </p:cSld>
+  <p:clrMapOvr>
+    <a:masterClrMapping/>
+  </p:clrMapOvr>
+  <p:timing>
+    <p:tnLst>
+      <p:par>
+        <p:cTn xmlns:p14="http://schemas.microsoft.com/office/powerpoint/2010/main" id="1" dur="indefinite" restart="never" nodeType="tmRoot"/>
+      </p:par>
+    </p:tnLst>
+  </p:timing>
+</p:sld>
+</file>
+
+<file path=ppt/slides/slide27.xml><?xml version="1.0" encoding="utf-8"?>
+<p:sld xmlns:a="http://schemas.openxmlformats.org/drawingml/2006/main" xmlns:r="http://schemas.openxmlformats.org/officeDocument/2006/relationships" xmlns:p="http://schemas.openxmlformats.org/presentationml/2006/main">
+  <p:cSld>
+    <p:spTree>
+      <p:nvGrpSpPr>
+        <p:cNvPr id="1" name=""/>
+        <p:cNvGrpSpPr/>
+        <p:nvPr/>
+      </p:nvGrpSpPr>
+      <p:grpSpPr>
+        <a:xfrm>
+          <a:off x="0" y="0"/>
+          <a:ext cx="0" cy="0"/>
+          <a:chOff x="0" y="0"/>
+          <a:chExt cx="0" cy="0"/>
+        </a:xfrm>
+      </p:grpSpPr>
+      <p:pic>
+        <p:nvPicPr>
+          <p:cNvPr id="9" name="Picture 8" descr="Screen Shot 2016-02-04 at 3.45.06 PM.png"/>
+          <p:cNvPicPr>
+            <a:picLocks noChangeAspect="1"/>
+          </p:cNvPicPr>
+          <p:nvPr/>
+        </p:nvPicPr>
+        <p:blipFill>
+          <a:blip r:embed="rId2">
+            <a:extLst>
+              <a:ext uri="{28A0092B-C50C-407E-A947-70E740481C1C}">
+                <a14:useLocalDpi xmlns:a14="http://schemas.microsoft.com/office/drawing/2010/main" val="0"/>
+              </a:ext>
+            </a:extLst>
+          </a:blip>
+          <a:stretch>
+            <a:fillRect/>
+          </a:stretch>
+        </p:blipFill>
+        <p:spPr>
+          <a:xfrm>
+            <a:off x="0" y="0"/>
+            <a:ext cx="4514563" cy="5143500"/>
+          </a:xfrm>
+          <a:prstGeom prst="rect">
+            <a:avLst/>
+          </a:prstGeom>
+        </p:spPr>
+      </p:pic>
+      <p:pic>
+        <p:nvPicPr>
+          <p:cNvPr id="11" name="Picture 10" descr="Screen Shot 2016-02-04 at 3.45.44 PM.png"/>
+          <p:cNvPicPr>
+            <a:picLocks noChangeAspect="1"/>
+          </p:cNvPicPr>
+          <p:nvPr/>
+        </p:nvPicPr>
+        <p:blipFill>
+          <a:blip r:embed="rId3">
+            <a:extLst>
+              <a:ext uri="{28A0092B-C50C-407E-A947-70E740481C1C}">
+                <a14:useLocalDpi xmlns:a14="http://schemas.microsoft.com/office/drawing/2010/main" val="0"/>
+              </a:ext>
+            </a:extLst>
+          </a:blip>
+          <a:stretch>
+            <a:fillRect/>
+          </a:stretch>
+        </p:blipFill>
+        <p:spPr>
+          <a:xfrm>
+            <a:off x="4161234" y="0"/>
+            <a:ext cx="4982766" cy="5143500"/>
+          </a:xfrm>
+          <a:prstGeom prst="rect">
+            <a:avLst/>
+          </a:prstGeom>
+        </p:spPr>
+      </p:pic>
+      <p:sp>
+        <p:nvSpPr>
+          <p:cNvPr id="12" name="TextBox 11"/>
+          <p:cNvSpPr txBox="1"/>
+          <p:nvPr/>
+        </p:nvSpPr>
+        <p:spPr>
+          <a:xfrm>
+            <a:off x="8371898" y="33765"/>
+            <a:ext cx="509550" cy="307777"/>
+          </a:xfrm>
+          <a:prstGeom prst="rect">
+            <a:avLst/>
+          </a:prstGeom>
+          <a:noFill/>
+        </p:spPr>
+        <p:txBody>
+          <a:bodyPr wrap="none" rtlCol="0">
+            <a:spAutoFit/>
+          </a:bodyPr>
+          <a:lstStyle/>
+          <a:p>
+            <a:r>
+              <a:rPr lang="en-US" sz="1400" dirty="0" smtClean="0">
+                <a:solidFill>
+                  <a:srgbClr val="FF0000"/>
+                </a:solidFill>
+              </a:rPr>
+              <a:t>Java</a:t>
+            </a:r>
+            <a:endParaRPr lang="en-US" sz="1400" dirty="0">
+              <a:solidFill>
+                <a:srgbClr val="FF0000"/>
+              </a:solidFill>
+            </a:endParaRPr>
+          </a:p>
+        </p:txBody>
+      </p:sp>
+    </p:spTree>
+    <p:extLst>
+      <p:ext uri="{BB962C8B-B14F-4D97-AF65-F5344CB8AC3E}">
+        <p14:creationId xmlns:p14="http://schemas.microsoft.com/office/powerpoint/2010/main" val="2741906039"/>
+      </p:ext>
+    </p:extLst>
+  </p:cSld>
+  <p:clrMapOvr>
+    <a:masterClrMapping/>
+  </p:clrMapOvr>
+  <p:timing>
+    <p:tnLst>
+      <p:par>
+        <p:cTn xmlns:p14="http://schemas.microsoft.com/office/powerpoint/2010/main" id="1" dur="indefinite" restart="never" nodeType="tmRoot"/>
+      </p:par>
+    </p:tnLst>
+  </p:timing>
+</p:sld>
+</file>
+
+<file path=ppt/slides/slide28.xml><?xml version="1.0" encoding="utf-8"?>
+<p:sld xmlns:a="http://schemas.openxmlformats.org/drawingml/2006/main" xmlns:r="http://schemas.openxmlformats.org/officeDocument/2006/relationships" xmlns:p="http://schemas.openxmlformats.org/presentationml/2006/main">
+  <p:cSld>
+    <p:spTree>
+      <p:nvGrpSpPr>
+        <p:cNvPr id="1" name=""/>
+        <p:cNvGrpSpPr/>
+        <p:nvPr/>
+      </p:nvGrpSpPr>
+      <p:grpSpPr>
+        <a:xfrm>
+          <a:off x="0" y="0"/>
+          <a:ext cx="0" cy="0"/>
+          <a:chOff x="0" y="0"/>
+          <a:chExt cx="0" cy="0"/>
+        </a:xfrm>
+      </p:grpSpPr>
+      <p:sp>
+        <p:nvSpPr>
+          <p:cNvPr id="2" name="Title 1"/>
+          <p:cNvSpPr>
+            <a:spLocks noGrp="1"/>
+          </p:cNvSpPr>
+          <p:nvPr>
+            <p:ph type="title"/>
+          </p:nvPr>
+        </p:nvSpPr>
+        <p:spPr/>
+        <p:txBody>
+          <a:bodyPr/>
+          <a:lstStyle/>
+          <a:p>
+            <a:r>
+              <a:rPr lang="en-US" dirty="0" smtClean="0"/>
+              <a:t>Metrics of Shape Models</a:t>
+            </a:r>
+            <a:endParaRPr lang="en-US" dirty="0"/>
+          </a:p>
+        </p:txBody>
+      </p:sp>
+      <p:graphicFrame>
+        <p:nvGraphicFramePr>
+          <p:cNvPr id="6" name="Content Placeholder 5"/>
+          <p:cNvGraphicFramePr>
+            <a:graphicFrameLocks noGrp="1"/>
+          </p:cNvGraphicFramePr>
+          <p:nvPr>
+            <p:ph idx="1"/>
+            <p:extLst>
+              <p:ext uri="{D42A27DB-BD31-4B8C-83A1-F6EECF244321}">
+                <p14:modId xmlns:p14="http://schemas.microsoft.com/office/powerpoint/2010/main" val="2814718542"/>
+              </p:ext>
+            </p:extLst>
+          </p:nvPr>
+        </p:nvGraphicFramePr>
+        <p:xfrm>
+          <a:off x="685800" y="1401763"/>
+          <a:ext cx="7770813" cy="1854200"/>
+        </p:xfrm>
+        <a:graphic>
+          <a:graphicData uri="http://schemas.openxmlformats.org/drawingml/2006/table">
+            <a:tbl>
+              <a:tblPr firstRow="1" bandRow="1">
+                <a:tableStyleId>{5C22544A-7EE6-4342-B048-85BDC9FD1C3A}</a:tableStyleId>
+              </a:tblPr>
+              <a:tblGrid>
+                <a:gridCol w="2590271"/>
+                <a:gridCol w="2590271"/>
+                <a:gridCol w="2590271"/>
+              </a:tblGrid>
+              <a:tr h="370840">
+                <a:tc>
+                  <a:txBody>
+                    <a:bodyPr/>
+                    <a:lstStyle/>
+                    <a:p>
+                      <a:r>
+                        <a:rPr lang="en-US" dirty="0" smtClean="0"/>
+                        <a:t>Language</a:t>
+                      </a:r>
+                      <a:endParaRPr lang="en-US" dirty="0"/>
+                    </a:p>
+                  </a:txBody>
+                  <a:tcPr/>
+                </a:tc>
+                <a:tc>
+                  <a:txBody>
+                    <a:bodyPr/>
+                    <a:lstStyle/>
+                    <a:p>
+                      <a:r>
+                        <a:rPr lang="en-US" dirty="0" smtClean="0"/>
+                        <a:t>Number of Lines</a:t>
+                      </a:r>
+                      <a:endParaRPr lang="en-US" dirty="0"/>
+                    </a:p>
+                  </a:txBody>
+                  <a:tcPr/>
+                </a:tc>
+                <a:tc>
+                  <a:txBody>
+                    <a:bodyPr/>
+                    <a:lstStyle/>
+                    <a:p>
+                      <a:r>
+                        <a:rPr lang="en-US" dirty="0" smtClean="0"/>
+                        <a:t>Number</a:t>
+                      </a:r>
+                      <a:r>
+                        <a:rPr lang="en-US" baseline="0" dirty="0" smtClean="0"/>
+                        <a:t> of Characters</a:t>
+                      </a:r>
+                      <a:endParaRPr lang="en-US" dirty="0"/>
+                    </a:p>
+                  </a:txBody>
+                  <a:tcPr/>
+                </a:tc>
+              </a:tr>
+              <a:tr h="370840">
+                <a:tc>
+                  <a:txBody>
+                    <a:bodyPr/>
+                    <a:lstStyle/>
+                    <a:p>
+                      <a:r>
+                        <a:rPr lang="en-US" b="1" dirty="0" smtClean="0">
+                          <a:solidFill>
+                            <a:srgbClr val="FF0000"/>
+                          </a:solidFill>
+                        </a:rPr>
+                        <a:t>K</a:t>
+                      </a:r>
+                      <a:endParaRPr lang="en-US" b="1" dirty="0">
+                        <a:solidFill>
+                          <a:srgbClr val="FF0000"/>
+                        </a:solidFill>
+                      </a:endParaRPr>
+                    </a:p>
+                  </a:txBody>
+                  <a:tcPr/>
+                </a:tc>
+                <a:tc>
+                  <a:txBody>
+                    <a:bodyPr/>
+                    <a:lstStyle/>
+                    <a:p>
+                      <a:r>
+                        <a:rPr lang="en-US" dirty="0" smtClean="0"/>
+                        <a:t>44</a:t>
+                      </a:r>
+                      <a:endParaRPr lang="en-US" dirty="0"/>
+                    </a:p>
+                  </a:txBody>
+                  <a:tcPr/>
+                </a:tc>
+                <a:tc>
+                  <a:txBody>
+                    <a:bodyPr/>
+                    <a:lstStyle/>
+                    <a:p>
+                      <a:r>
+                        <a:rPr lang="en-US" dirty="0" smtClean="0"/>
+                        <a:t>649</a:t>
+                      </a:r>
+                      <a:endParaRPr lang="en-US" dirty="0"/>
+                    </a:p>
+                  </a:txBody>
+                  <a:tcPr/>
+                </a:tc>
+              </a:tr>
+              <a:tr h="370840">
+                <a:tc>
+                  <a:txBody>
+                    <a:bodyPr/>
+                    <a:lstStyle/>
+                    <a:p>
+                      <a:r>
+                        <a:rPr lang="en-US" b="1" dirty="0" smtClean="0">
+                          <a:solidFill>
+                            <a:srgbClr val="FF0000"/>
+                          </a:solidFill>
+                        </a:rPr>
+                        <a:t>Scala</a:t>
+                      </a:r>
+                      <a:endParaRPr lang="en-US" b="1" dirty="0">
+                        <a:solidFill>
+                          <a:srgbClr val="FF0000"/>
+                        </a:solidFill>
+                      </a:endParaRPr>
+                    </a:p>
+                  </a:txBody>
+                  <a:tcPr/>
+                </a:tc>
+                <a:tc>
+                  <a:txBody>
+                    <a:bodyPr/>
+                    <a:lstStyle/>
+                    <a:p>
+                      <a:r>
+                        <a:rPr lang="en-US" dirty="0" smtClean="0"/>
+                        <a:t>44</a:t>
+                      </a:r>
+                      <a:endParaRPr lang="en-US" dirty="0"/>
+                    </a:p>
+                  </a:txBody>
+                  <a:tcPr/>
+                </a:tc>
+                <a:tc>
+                  <a:txBody>
+                    <a:bodyPr/>
+                    <a:lstStyle/>
+                    <a:p>
+                      <a:r>
+                        <a:rPr lang="en-US" dirty="0" smtClean="0"/>
+                        <a:t>714</a:t>
+                      </a:r>
+                      <a:endParaRPr lang="en-US" dirty="0"/>
+                    </a:p>
+                  </a:txBody>
+                  <a:tcPr/>
+                </a:tc>
+              </a:tr>
+              <a:tr h="370840">
+                <a:tc>
+                  <a:txBody>
+                    <a:bodyPr/>
+                    <a:lstStyle/>
+                    <a:p>
+                      <a:r>
+                        <a:rPr lang="en-US" b="1" dirty="0" smtClean="0">
+                          <a:solidFill>
+                            <a:srgbClr val="FF0000"/>
+                          </a:solidFill>
+                        </a:rPr>
+                        <a:t>Java</a:t>
+                      </a:r>
+                      <a:endParaRPr lang="en-US" b="1" dirty="0">
+                        <a:solidFill>
+                          <a:srgbClr val="FF0000"/>
+                        </a:solidFill>
+                      </a:endParaRPr>
+                    </a:p>
+                  </a:txBody>
+                  <a:tcPr/>
+                </a:tc>
+                <a:tc>
+                  <a:txBody>
+                    <a:bodyPr/>
+                    <a:lstStyle/>
+                    <a:p>
+                      <a:r>
+                        <a:rPr lang="en-US" b="1" dirty="0" smtClean="0">
+                          <a:solidFill>
+                            <a:schemeClr val="accent4"/>
+                          </a:solidFill>
+                        </a:rPr>
+                        <a:t>54</a:t>
+                      </a:r>
+                      <a:endParaRPr lang="en-US" b="1" dirty="0">
+                        <a:solidFill>
+                          <a:schemeClr val="accent4"/>
+                        </a:solidFill>
+                      </a:endParaRPr>
+                    </a:p>
+                  </a:txBody>
+                  <a:tcPr/>
+                </a:tc>
+                <a:tc>
+                  <a:txBody>
+                    <a:bodyPr/>
+                    <a:lstStyle/>
+                    <a:p>
+                      <a:r>
+                        <a:rPr lang="en-US" dirty="0" smtClean="0"/>
+                        <a:t>826</a:t>
+                      </a:r>
+                      <a:endParaRPr lang="en-US" dirty="0"/>
+                    </a:p>
+                  </a:txBody>
+                  <a:tcPr/>
+                </a:tc>
+              </a:tr>
+              <a:tr h="370840">
+                <a:tc>
+                  <a:txBody>
+                    <a:bodyPr/>
+                    <a:lstStyle/>
+                    <a:p>
+                      <a:r>
+                        <a:rPr lang="en-US" b="1" dirty="0" smtClean="0">
+                          <a:solidFill>
+                            <a:srgbClr val="FF0000"/>
+                          </a:solidFill>
+                        </a:rPr>
+                        <a:t>OCLInEcore</a:t>
+                      </a:r>
+                      <a:endParaRPr lang="en-US" b="1" dirty="0">
+                        <a:solidFill>
+                          <a:srgbClr val="FF0000"/>
+                        </a:solidFill>
+                      </a:endParaRPr>
+                    </a:p>
+                  </a:txBody>
+                  <a:tcPr/>
+                </a:tc>
+                <a:tc>
+                  <a:txBody>
+                    <a:bodyPr/>
+                    <a:lstStyle/>
+                    <a:p>
+                      <a:r>
+                        <a:rPr lang="en-US" dirty="0" smtClean="0"/>
+                        <a:t>45</a:t>
+                      </a:r>
+                      <a:endParaRPr lang="en-US" dirty="0"/>
+                    </a:p>
+                  </a:txBody>
+                  <a:tcPr/>
+                </a:tc>
+                <a:tc>
+                  <a:txBody>
+                    <a:bodyPr/>
+                    <a:lstStyle/>
+                    <a:p>
+                      <a:r>
+                        <a:rPr lang="en-US" b="1" dirty="0" smtClean="0">
+                          <a:solidFill>
+                            <a:srgbClr val="E8950E"/>
+                          </a:solidFill>
+                        </a:rPr>
+                        <a:t>899</a:t>
+                      </a:r>
+                      <a:endParaRPr lang="en-US" b="1" dirty="0">
+                        <a:solidFill>
+                          <a:srgbClr val="E8950E"/>
+                        </a:solidFill>
+                      </a:endParaRPr>
+                    </a:p>
+                  </a:txBody>
+                  <a:tcPr/>
+                </a:tc>
+              </a:tr>
+            </a:tbl>
+          </a:graphicData>
+        </a:graphic>
+      </p:graphicFrame>
+      <p:sp>
+        <p:nvSpPr>
+          <p:cNvPr id="7" name="TextBox 6"/>
+          <p:cNvSpPr txBox="1"/>
+          <p:nvPr/>
+        </p:nvSpPr>
+        <p:spPr>
+          <a:xfrm>
+            <a:off x="685800" y="3927231"/>
+            <a:ext cx="7950802" cy="646331"/>
+          </a:xfrm>
+          <a:prstGeom prst="rect">
+            <a:avLst/>
+          </a:prstGeom>
+          <a:noFill/>
+        </p:spPr>
+        <p:txBody>
+          <a:bodyPr wrap="none" rtlCol="0">
+            <a:spAutoFit/>
+          </a:bodyPr>
+          <a:lstStyle/>
+          <a:p>
+            <a:r>
+              <a:rPr lang="en-US" dirty="0" smtClean="0"/>
+              <a:t>Models/programs </a:t>
+            </a:r>
+            <a:r>
+              <a:rPr lang="en-US" dirty="0"/>
+              <a:t>e</a:t>
+            </a:r>
+            <a:r>
+              <a:rPr lang="en-US" dirty="0" smtClean="0"/>
+              <a:t>dited </a:t>
+            </a:r>
+            <a:r>
+              <a:rPr lang="en-US" dirty="0" smtClean="0"/>
+              <a:t>to use same spacing, names and use same keyword for</a:t>
+            </a:r>
+          </a:p>
+          <a:p>
+            <a:r>
+              <a:rPr lang="en-US" dirty="0"/>
+              <a:t>r</a:t>
+            </a:r>
+            <a:r>
+              <a:rPr lang="en-US" dirty="0" smtClean="0"/>
+              <a:t>equirements: (‘invariant’ instead of ‘</a:t>
+            </a:r>
+            <a:r>
+              <a:rPr lang="en-US" dirty="0" err="1" smtClean="0"/>
+              <a:t>req</a:t>
+            </a:r>
+            <a:r>
+              <a:rPr lang="en-US" dirty="0" smtClean="0"/>
+              <a:t>’ in K to be fair).</a:t>
+            </a:r>
+            <a:endParaRPr lang="en-US" dirty="0"/>
+          </a:p>
+        </p:txBody>
+      </p:sp>
+    </p:spTree>
+    <p:extLst>
+      <p:ext uri="{BB962C8B-B14F-4D97-AF65-F5344CB8AC3E}">
+        <p14:creationId xmlns:p14="http://schemas.microsoft.com/office/powerpoint/2010/main" val="1145423269"/>
+      </p:ext>
+    </p:extLst>
+  </p:cSld>
+  <p:clrMapOvr>
+    <a:masterClrMapping/>
+  </p:clrMapOvr>
+  <p:timing>
+    <p:tnLst>
+      <p:par>
+        <p:cTn xmlns:p14="http://schemas.microsoft.com/office/powerpoint/2010/main" id="1" dur="indefinite" restart="never" nodeType="tmRoot"/>
+      </p:par>
+    </p:tnLst>
+  </p:timing>
+</p:sld>
+</file>
+
+<file path=ppt/slides/slide29.xml><?xml version="1.0" encoding="utf-8"?>
+<p:sld xmlns:a="http://schemas.openxmlformats.org/drawingml/2006/main" xmlns:r="http://schemas.openxmlformats.org/officeDocument/2006/relationships" xmlns:p="http://schemas.openxmlformats.org/presentationml/2006/main">
+  <p:cSld>
+    <p:spTree>
+      <p:nvGrpSpPr>
+        <p:cNvPr id="1" name=""/>
+        <p:cNvGrpSpPr/>
+        <p:nvPr/>
+      </p:nvGrpSpPr>
+      <p:grpSpPr>
+        <a:xfrm>
+          <a:off x="0" y="0"/>
+          <a:ext cx="0" cy="0"/>
+          <a:chOff x="0" y="0"/>
+          <a:chExt cx="0" cy="0"/>
+        </a:xfrm>
+      </p:grpSpPr>
+      <p:sp>
+        <p:nvSpPr>
+          <p:cNvPr id="4" name="Title 3"/>
+          <p:cNvSpPr>
+            <a:spLocks noGrp="1"/>
+          </p:cNvSpPr>
+          <p:nvPr>
+            <p:ph type="title"/>
+          </p:nvPr>
+        </p:nvSpPr>
+        <p:spPr/>
+        <p:txBody>
+          <a:bodyPr/>
+          <a:lstStyle/>
+          <a:p>
+            <a:r>
+              <a:rPr lang="en-US" dirty="0" smtClean="0"/>
+              <a:t>In a Graph</a:t>
+            </a:r>
+            <a:endParaRPr lang="en-US" dirty="0"/>
+          </a:p>
+        </p:txBody>
+      </p:sp>
+      <p:graphicFrame>
+        <p:nvGraphicFramePr>
+          <p:cNvPr id="5" name="Chart 4"/>
+          <p:cNvGraphicFramePr>
+            <a:graphicFrameLocks/>
+          </p:cNvGraphicFramePr>
+          <p:nvPr>
+            <p:extLst>
+              <p:ext uri="{D42A27DB-BD31-4B8C-83A1-F6EECF244321}">
+                <p14:modId xmlns:p14="http://schemas.microsoft.com/office/powerpoint/2010/main" val="3166444322"/>
+              </p:ext>
+            </p:extLst>
+          </p:nvPr>
+        </p:nvGraphicFramePr>
+        <p:xfrm>
+          <a:off x="2448327" y="1830405"/>
+          <a:ext cx="4572000" cy="2743200"/>
+        </p:xfrm>
+        <a:graphic>
+          <a:graphicData uri="http://schemas.openxmlformats.org/drawingml/2006/chart">
+            <c:chart xmlns:c="http://schemas.openxmlformats.org/drawingml/2006/chart" xmlns:r="http://schemas.openxmlformats.org/officeDocument/2006/relationships" r:id="rId2"/>
+          </a:graphicData>
+        </a:graphic>
+      </p:graphicFrame>
+    </p:spTree>
+    <p:extLst>
+      <p:ext uri="{BB962C8B-B14F-4D97-AF65-F5344CB8AC3E}">
+        <p14:creationId xmlns:p14="http://schemas.microsoft.com/office/powerpoint/2010/main" val="3786215379"/>
       </p:ext>
     </p:extLst>
   </p:cSld>
@@ -9355,20 +9416,36 @@
         <p:spPr/>
         <p:txBody>
           <a:bodyPr>
-            <a:normAutofit fontScale="62500" lnSpcReduction="20000"/>
+            <a:normAutofit fontScale="55000" lnSpcReduction="20000"/>
           </a:bodyPr>
           <a:lstStyle/>
           <a:p>
             <a:r>
               <a:rPr lang="en-US" dirty="0" smtClean="0"/>
-              <a:t>The Book Example (two simple classes)</a:t>
+              <a:t>The Book </a:t>
+            </a:r>
+            <a:r>
+              <a:rPr lang="en-US" dirty="0" smtClean="0"/>
+              <a:t>example </a:t>
+            </a:r>
+            <a:r>
+              <a:rPr lang="en-US" dirty="0" smtClean="0"/>
+              <a:t>(two simple classes)</a:t>
             </a:r>
           </a:p>
           <a:p>
             <a:pPr lvl="1"/>
             <a:r>
               <a:rPr lang="en-US" dirty="0" smtClean="0"/>
-              <a:t>Formulated in K, OCLInEcore and Scala</a:t>
+              <a:t>Formulated in K, </a:t>
+            </a:r>
+            <a:r>
+              <a:rPr lang="en-US" dirty="0" smtClean="0"/>
+              <a:t>OCLInEcore, </a:t>
+            </a:r>
+            <a:r>
+              <a:rPr lang="en-US" dirty="0" smtClean="0"/>
+              <a:t>and Scala</a:t>
             </a:r>
           </a:p>
           <a:p>
@@ -9380,27 +9457,82 @@
           </a:p>
           <a:p>
             <a:r>
+              <a:rPr lang="en-US" dirty="0"/>
+              <a:t>The library </a:t>
+            </a:r>
+            <a:r>
               <a:rPr lang="en-US" dirty="0" smtClean="0"/>
-              <a:t>The Shapes example</a:t>
-            </a:r>
+              <a:t>example (bigger example with more complex constraints)</a:t>
+            </a:r>
+            <a:endParaRPr lang="en-US" dirty="0"/>
           </a:p>
           <a:p>
             <a:pPr lvl="1"/>
             <a:r>
+              <a:rPr lang="en-US" dirty="0"/>
+              <a:t>Formulated in K, OCLInEcore, and Scala</a:t>
+            </a:r>
+          </a:p>
+          <a:p>
+            <a:r>
               <a:rPr lang="en-US" dirty="0" smtClean="0"/>
-              <a:t>Formulated in K, OCLInEcore, Scala and Java</a:t>
-            </a:r>
-          </a:p>
-          <a:p>
+              <a:t>The </a:t>
+            </a:r>
             <a:r>
               <a:rPr lang="en-US" dirty="0" smtClean="0"/>
-              <a:t>OCL versus Predicate Logic</a:t>
-            </a:r>
-          </a:p>
-          <a:p>
+              <a:t>Shapes example</a:t>
+            </a:r>
+          </a:p>
+          <a:p>
+            <a:pPr lvl="1"/>
             <a:r>
               <a:rPr lang="en-US" dirty="0" smtClean="0"/>
-              <a:t>Feature Comparison of languages</a:t>
+              <a:t>Formulated in K, OCLInEcore, </a:t>
+            </a:r>
+            <a:r>
+              <a:rPr lang="en-US" dirty="0" smtClean="0"/>
+              <a:t>Scala, </a:t>
+            </a:r>
+            <a:r>
+              <a:rPr lang="en-US" dirty="0" smtClean="0"/>
+              <a:t>and Java</a:t>
+            </a:r>
+          </a:p>
+          <a:p>
+            <a:r>
+              <a:rPr lang="en-US" dirty="0" smtClean="0"/>
+              <a:t>OCL </a:t>
+            </a:r>
+            <a:r>
+              <a:rPr lang="en-US" dirty="0" smtClean="0"/>
+              <a:t>versus </a:t>
+            </a:r>
+            <a:r>
+              <a:rPr lang="en-US" dirty="0" smtClean="0"/>
+              <a:t>predicate </a:t>
+            </a:r>
+            <a:r>
+              <a:rPr lang="en-US" dirty="0"/>
+              <a:t>l</a:t>
+            </a:r>
+            <a:r>
+              <a:rPr lang="en-US" dirty="0" smtClean="0"/>
+              <a:t>ogic</a:t>
+            </a:r>
+            <a:endParaRPr lang="en-US" dirty="0" smtClean="0"/>
+          </a:p>
+          <a:p>
+            <a:r>
+              <a:rPr lang="en-US" dirty="0" smtClean="0"/>
+              <a:t>Feature </a:t>
+            </a:r>
+            <a:r>
+              <a:rPr lang="en-US" dirty="0" smtClean="0"/>
+              <a:t>comparison </a:t>
+            </a:r>
+            <a:r>
+              <a:rPr lang="en-US" dirty="0" smtClean="0"/>
+              <a:t>of languages</a:t>
             </a:r>
           </a:p>
           <a:p>
@@ -9408,13 +9540,7 @@
               <a:rPr lang="en-US" dirty="0" smtClean="0"/>
               <a:t>Conclusions</a:t>
             </a:r>
-          </a:p>
-          <a:p>
-            <a:r>
-              <a:rPr lang="en-US" dirty="0" smtClean="0"/>
-              <a:t>Appendix: the library model in K, OCLInEcore, and Scala</a:t>
-            </a:r>
-            <a:endParaRPr lang="en-US" dirty="0"/>
+            <a:endParaRPr lang="en-US" dirty="0" smtClean="0"/>
           </a:p>
         </p:txBody>
       </p:sp>
@@ -10103,7 +10229,7 @@
             <p:ph idx="1"/>
             <p:extLst>
               <p:ext uri="{D42A27DB-BD31-4B8C-83A1-F6EECF244321}">
-                <p14:modId xmlns:p14="http://schemas.microsoft.com/office/powerpoint/2010/main" val="4209278696"/>
+                <p14:modId xmlns:p14="http://schemas.microsoft.com/office/powerpoint/2010/main" val="3205444002"/>
               </p:ext>
             </p:extLst>
           </p:nvPr>
@@ -10349,7 +10475,11 @@
                     <a:p>
                       <a:r>
                         <a:rPr lang="en-US" dirty="0" smtClean="0"/>
-                        <a:t>Composes</a:t>
+                        <a:t>Supports</a:t>
+                      </a:r>
+                      <a:r>
+                        <a:rPr lang="en-US" baseline="0" dirty="0" smtClean="0"/>
+                        <a:t> “parts of” (black diamond)</a:t>
                       </a:r>
                       <a:endParaRPr lang="en-US" dirty="0"/>
                     </a:p>
@@ -10543,7 +10673,7 @@
                     <a:p>
                       <a:r>
                         <a:rPr lang="en-US" dirty="0" smtClean="0"/>
-                        <a:t>(-)</a:t>
+                        <a:t>(+)</a:t>
                       </a:r>
                       <a:endParaRPr lang="en-US" dirty="0"/>
                     </a:p>
@@ -10645,7 +10775,19 @@
                     <a:p>
                       <a:r>
                         <a:rPr lang="en-US" dirty="0" smtClean="0"/>
-                        <a:t>Opposite properties</a:t>
+                        <a:t>Opposite </a:t>
+                      </a:r>
+                      <a:r>
+                        <a:rPr lang="en-US" dirty="0" smtClean="0"/>
+                        <a:t>properties (</a:t>
+                      </a:r>
+                      <a:r>
+                        <a:rPr lang="en-US" dirty="0" err="1" smtClean="0"/>
+                        <a:t>library#books</a:t>
+                      </a:r>
+                      <a:r>
+                        <a:rPr lang="en-US" dirty="0" smtClean="0"/>
+                        <a:t>)</a:t>
                       </a:r>
                       <a:endParaRPr lang="en-US" dirty="0"/>
                     </a:p>
@@ -10908,7 +11050,7 @@
             <p:ph idx="1"/>
             <p:extLst>
               <p:ext uri="{D42A27DB-BD31-4B8C-83A1-F6EECF244321}">
-                <p14:modId xmlns:p14="http://schemas.microsoft.com/office/powerpoint/2010/main" val="231455144"/>
+                <p14:modId xmlns:p14="http://schemas.microsoft.com/office/powerpoint/2010/main" val="170340893"/>
               </p:ext>
             </p:extLst>
           </p:nvPr>
@@ -11442,7 +11584,7 @@
                     <a:p>
                       <a:r>
                         <a:rPr lang="en-US" dirty="0" smtClean="0"/>
-                        <a:t>+</a:t>
+                        <a:t>+ (1.8)</a:t>
                       </a:r>
                       <a:endParaRPr lang="en-US" dirty="0"/>
                     </a:p>
@@ -11486,7 +11628,15 @@
                     <a:p>
                       <a:r>
                         <a:rPr lang="en-US" dirty="0" smtClean="0"/>
-                        <a:t>(+)</a:t>
+                        <a:t>(+</a:t>
+                      </a:r>
+                      <a:r>
+                        <a:rPr lang="en-US" dirty="0" smtClean="0"/>
+                        <a:t>) </a:t>
+                      </a:r>
+                      <a:r>
+                        <a:rPr lang="en-US" dirty="0" err="1" smtClean="0"/>
+                        <a:t>datatypes</a:t>
                       </a:r>
                       <a:endParaRPr lang="en-US" dirty="0"/>
                     </a:p>
@@ -11721,14 +11871,14 @@
             <p:ph idx="1"/>
             <p:extLst>
               <p:ext uri="{D42A27DB-BD31-4B8C-83A1-F6EECF244321}">
-                <p14:modId xmlns:p14="http://schemas.microsoft.com/office/powerpoint/2010/main" val="1204107155"/>
+                <p14:modId xmlns:p14="http://schemas.microsoft.com/office/powerpoint/2010/main" val="3261863961"/>
               </p:ext>
             </p:extLst>
           </p:nvPr>
         </p:nvGraphicFramePr>
         <p:xfrm>
           <a:off x="84233" y="160351"/>
-          <a:ext cx="8983375" cy="4690360"/>
+          <a:ext cx="8983375" cy="4782880"/>
         </p:xfrm>
         <a:graphic>
           <a:graphicData uri="http://schemas.openxmlformats.org/drawingml/2006/table">
@@ -11740,8 +11890,8 @@
                 <a:gridCol w="4651881"/>
                 <a:gridCol w="773438"/>
                 <a:gridCol w="1518231"/>
-                <a:gridCol w="1031252"/>
-                <a:gridCol w="1008573"/>
+                <a:gridCol w="826679"/>
+                <a:gridCol w="1213146"/>
               </a:tblGrid>
               <a:tr h="469036">
                 <a:tc>
@@ -11851,7 +12001,11 @@
                     <a:p>
                       <a:r>
                         <a:rPr lang="en-US" dirty="0" smtClean="0"/>
-                        <a:t>-</a:t>
+                        <a:t>- (</a:t>
+                      </a:r>
+                      <a:r>
+                        <a:rPr lang="en-US" baseline="0" dirty="0" smtClean="0"/>
+                        <a:t>GUI only)</a:t>
                       </a:r>
                       <a:endParaRPr lang="en-US" dirty="0"/>
                     </a:p>
@@ -12175,7 +12329,11 @@
                     <a:p>
                       <a:r>
                         <a:rPr lang="en-US" dirty="0" smtClean="0"/>
-                        <a:t>(-)</a:t>
+                        <a:t>(-</a:t>
+                      </a:r>
+                      <a:r>
+                        <a:rPr lang="en-US" dirty="0" smtClean="0"/>
+                        <a:t>) interfaces</a:t>
                       </a:r>
                       <a:endParaRPr lang="en-US" dirty="0"/>
                     </a:p>
@@ -12223,9 +12381,33 @@
                     <a:p>
                       <a:r>
                         <a:rPr lang="en-US" dirty="0" smtClean="0"/>
-                        <a:t>+</a:t>
-                      </a:r>
-                      <a:endParaRPr lang="en-US" dirty="0"/>
+                        <a:t>+ (</a:t>
+                      </a:r>
+                      <a:r>
+                        <a:rPr lang="en-US" dirty="0" err="1" smtClean="0"/>
+                        <a:t>ecore</a:t>
+                      </a:r>
+                      <a:r>
+                        <a:rPr lang="en-US" dirty="0" smtClean="0"/>
+                        <a:t>)</a:t>
+                      </a:r>
+                      <a:r>
+                        <a:rPr lang="en-US" baseline="0" dirty="0" smtClean="0"/>
+                        <a:t> </a:t>
+                      </a:r>
+                      <a:r>
+                        <a:rPr lang="en-US" b="1" baseline="0" dirty="0" smtClean="0">
+                          <a:solidFill>
+                            <a:srgbClr val="FF0000"/>
+                          </a:solidFill>
+                        </a:rPr>
+                        <a:t>?</a:t>
+                      </a:r>
+                      <a:endParaRPr lang="en-US" b="1" dirty="0">
+                        <a:solidFill>
+                          <a:srgbClr val="FF0000"/>
+                        </a:solidFill>
+                      </a:endParaRPr>
                     </a:p>
                   </a:txBody>
                   <a:tcPr/>
@@ -12281,9 +12463,21 @@
                     <a:p>
                       <a:r>
                         <a:rPr lang="en-US" dirty="0" smtClean="0"/>
-                        <a:t>-</a:t>
-                      </a:r>
-                      <a:endParaRPr lang="en-US" dirty="0"/>
+                        <a:t>- </a:t>
+                      </a:r>
+                      <a:r>
+                        <a:rPr lang="en-US" dirty="0" smtClean="0">
+                          <a:solidFill>
+                            <a:srgbClr val="0000FF"/>
+                          </a:solidFill>
+                        </a:rPr>
+                        <a:t>(*)</a:t>
+                      </a:r>
+                      <a:endParaRPr lang="en-US" dirty="0">
+                        <a:solidFill>
+                          <a:srgbClr val="0000FF"/>
+                        </a:solidFill>
+                      </a:endParaRPr>
                     </a:p>
                   </a:txBody>
                   <a:tcPr/>
@@ -12303,7 +12497,15 @@
                             <a:srgbClr val="FF0000"/>
                           </a:solidFill>
                         </a:rPr>
-                        <a:t>???</a:t>
+                        <a:t>?</a:t>
+                      </a:r>
+                      <a:r>
+                        <a:rPr lang="en-US" b="1" dirty="0" smtClean="0">
+                          <a:solidFill>
+                            <a:srgbClr val="FF0000"/>
+                          </a:solidFill>
+                        </a:rPr>
+                        <a:t>?</a:t>
                       </a:r>
                       <a:endParaRPr lang="en-US" b="1" dirty="0">
                         <a:solidFill>
@@ -12321,23 +12523,47 @@
                     <a:p>
                       <a:r>
                         <a:rPr lang="en-US" dirty="0" smtClean="0"/>
-                        <a:t>-</a:t>
-                      </a:r>
-                      <a:endParaRPr lang="en-US" dirty="0"/>
-                    </a:p>
-                  </a:txBody>
-                  <a:tcPr/>
-                </a:tc>
-                <a:tc>
-                  <a:txBody>
-                    <a:bodyPr/>
-                    <a:lstStyle/>
-                    <a:p>
-                      <a:r>
-                        <a:rPr lang="en-US" dirty="0" smtClean="0"/>
-                        <a:t>-</a:t>
-                      </a:r>
-                      <a:endParaRPr lang="en-US" dirty="0"/>
+                        <a:t>- </a:t>
+                      </a:r>
+                      <a:r>
+                        <a:rPr lang="en-US" dirty="0" smtClean="0">
+                          <a:solidFill>
+                            <a:srgbClr val="0000FF"/>
+                          </a:solidFill>
+                        </a:rPr>
+                        <a:t>(*)</a:t>
+                      </a:r>
+                      <a:endParaRPr lang="en-US" dirty="0">
+                        <a:solidFill>
+                          <a:srgbClr val="0000FF"/>
+                        </a:solidFill>
+                      </a:endParaRPr>
+                    </a:p>
+                  </a:txBody>
+                  <a:tcPr/>
+                </a:tc>
+                <a:tc>
+                  <a:txBody>
+                    <a:bodyPr/>
+                    <a:lstStyle/>
+                    <a:p>
+                      <a:r>
+                        <a:rPr lang="en-US" dirty="0" smtClean="0"/>
+                        <a:t>- </a:t>
+                      </a:r>
+                      <a:r>
+                        <a:rPr lang="en-US" dirty="0" smtClean="0">
+                          <a:solidFill>
+                            <a:srgbClr val="0000FF"/>
+                          </a:solidFill>
+                        </a:rPr>
+                        <a:t>(*)</a:t>
+                      </a:r>
+                      <a:endParaRPr lang="en-US" dirty="0">
+                        <a:solidFill>
+                          <a:srgbClr val="0000FF"/>
+                        </a:solidFill>
+                      </a:endParaRPr>
                     </a:p>
                   </a:txBody>
                   <a:tcPr/>
@@ -12419,13 +12645,33 @@
                   <a:tcPr/>
                 </a:tc>
               </a:tr>
-              <a:tr h="469036">
-                <a:tc>
-                  <a:txBody>
-                    <a:bodyPr/>
-                    <a:lstStyle/>
-                    <a:p>
-                      <a:endParaRPr lang="en-US" dirty="0"/>
+              <a:tr h="390512">
+                <a:tc>
+                  <a:txBody>
+                    <a:bodyPr/>
+                    <a:lstStyle/>
+                    <a:p>
+                      <a:r>
+                        <a:rPr lang="en-US" dirty="0" smtClean="0">
+                          <a:solidFill>
+                            <a:srgbClr val="0000FF"/>
+                          </a:solidFill>
+                        </a:rPr>
+                        <a:t>(*) : one can</a:t>
+                      </a:r>
+                      <a:r>
+                        <a:rPr lang="en-US" baseline="0" dirty="0" smtClean="0">
+                          <a:solidFill>
+                            <a:srgbClr val="0000FF"/>
+                          </a:solidFill>
+                        </a:rPr>
+                        <a:t> extend AST but it is hard work.</a:t>
+                      </a:r>
+                      <a:endParaRPr lang="en-US" dirty="0">
+                        <a:solidFill>
+                          <a:srgbClr val="0000FF"/>
+                        </a:solidFill>
+                      </a:endParaRPr>
                     </a:p>
                   </a:txBody>
                   <a:tcPr/>
@@ -12548,40 +12794,44 @@
         <p:spPr/>
         <p:txBody>
           <a:bodyPr>
-            <a:normAutofit fontScale="55000" lnSpcReduction="20000"/>
+            <a:normAutofit fontScale="62500" lnSpcReduction="20000"/>
           </a:bodyPr>
           <a:lstStyle/>
           <a:p>
             <a:r>
               <a:rPr lang="en-US" dirty="0" smtClean="0"/>
-              <a:t>OCLInEcore AST is accessible and can form base for SMT translation. Experiment was successful. </a:t>
+              <a:t>OCLInEcore AST is accessible and can form base for SMT translation. Experiment was successful. “Counting” in SMT </a:t>
             </a:r>
             <a:r>
               <a:rPr lang="en-US" dirty="0" smtClean="0"/>
-              <a:t>“Counting” </a:t>
+              <a:t>is, however, </a:t>
             </a:r>
             <a:r>
               <a:rPr lang="en-US" dirty="0" smtClean="0"/>
-              <a:t>in SMT </a:t>
+              <a:t>a problem for OCLInEcore as well as for </a:t>
             </a:r>
             <a:r>
               <a:rPr lang="en-US" dirty="0" smtClean="0"/>
-              <a:t>is a </a:t>
+              <a:t>K, and </a:t>
             </a:r>
             <a:r>
               <a:rPr lang="en-US" dirty="0" smtClean="0"/>
-              <a:t>problem for OCLInEcore as well as for K (and other languages</a:t>
+              <a:t>other </a:t>
             </a:r>
             <a:r>
               <a:rPr lang="en-US" dirty="0" smtClean="0"/>
-              <a:t>).</a:t>
+              <a:t>languages.</a:t>
             </a:r>
             <a:endParaRPr lang="en-US" dirty="0" smtClean="0"/>
           </a:p>
           <a:p>
             <a:r>
               <a:rPr lang="en-US" dirty="0" smtClean="0"/>
-              <a:t>Try out OCLInEcore for defining </a:t>
+              <a:t>Recommendation: Try </a:t>
+            </a:r>
+            <a:r>
+              <a:rPr lang="en-US" dirty="0" smtClean="0"/>
+              <a:t>out OCLInEcore for defining </a:t>
             </a:r>
             <a:r>
               <a:rPr lang="en-US" dirty="0" err="1" smtClean="0"/>
@@ -12589,15 +12839,11 @@
             </a:r>
             <a:r>
               <a:rPr lang="en-US" dirty="0" smtClean="0"/>
-              <a:t>. </a:t>
-            </a:r>
-            <a:r>
-              <a:rPr lang="en-US" dirty="0" smtClean="0"/>
-              <a:t>Can it </a:t>
-            </a:r>
-            <a:r>
-              <a:rPr lang="en-US" dirty="0" smtClean="0"/>
-              <a:t>support</a:t>
+              <a:t>. Can it support what want  (ignoring SMT question)</a:t>
+            </a:r>
+            <a:r>
+              <a:rPr lang="en-US" dirty="0"/>
+              <a:t>?</a:t>
             </a:r>
             <a:r>
               <a:rPr lang="en-US" dirty="0" smtClean="0"/>
@@ -12605,111 +12851,92 @@
             </a:r>
             <a:r>
               <a:rPr lang="en-US" dirty="0" smtClean="0"/>
-              <a:t>what want </a:t>
+              <a:t>Experiment with extending AST and </a:t>
+            </a:r>
+            <a:r>
+              <a:rPr lang="en-US" dirty="0" smtClean="0"/>
+              <a:t>extending </a:t>
+            </a:r>
+            <a:r>
+              <a:rPr lang="en-US" dirty="0" smtClean="0"/>
+              <a:t>syntax</a:t>
+            </a:r>
+            <a:r>
+              <a:rPr lang="en-US" dirty="0"/>
+              <a:t>.</a:t>
+            </a:r>
+            <a:endParaRPr lang="en-US" dirty="0" smtClean="0"/>
+          </a:p>
+          <a:p>
+            <a:r>
+              <a:rPr lang="en-US" dirty="0" smtClean="0"/>
+              <a:t>Systems we have not looked at seriously: </a:t>
+            </a:r>
+            <a:r>
+              <a:rPr lang="en-US" dirty="0" err="1" smtClean="0"/>
+              <a:t>Xcode</a:t>
+            </a:r>
+            <a:r>
+              <a:rPr lang="en-US" dirty="0"/>
+              <a:t>, Alf and </a:t>
+            </a:r>
+            <a:r>
+              <a:rPr lang="en-US" dirty="0" err="1" smtClean="0"/>
+              <a:t>Modelica</a:t>
+            </a:r>
+            <a:r>
+              <a:rPr lang="en-US" dirty="0" smtClean="0"/>
+              <a:t>.</a:t>
+            </a:r>
+          </a:p>
+          <a:p>
+            <a:r>
+              <a:rPr lang="en-US" dirty="0" smtClean="0"/>
+              <a:t>Scala is an option. One can define a translator from Scala to SMT. Some work has been done in this </a:t>
+            </a:r>
+            <a:r>
+              <a:rPr lang="en-US" dirty="0"/>
+              <a:t>direction already</a:t>
+            </a:r>
+            <a:r>
+              <a:rPr lang="en-US" dirty="0"/>
+              <a:t>: </a:t>
+            </a:r>
+            <a:r>
+              <a:rPr lang="en-US" dirty="0">
+                <a:solidFill>
+                  <a:srgbClr val="FFFF00"/>
+                </a:solidFill>
+              </a:rPr>
+              <a:t>https://</a:t>
+            </a:r>
+            <a:r>
+              <a:rPr lang="en-US" dirty="0" err="1" smtClean="0">
+                <a:solidFill>
+                  <a:srgbClr val="FFFF00"/>
+                </a:solidFill>
+              </a:rPr>
+              <a:t>leon.epfl.ch</a:t>
+            </a:r>
+            <a:r>
+              <a:rPr lang="en-US" dirty="0"/>
+              <a:t>.</a:t>
             </a:r>
             <a:r>
               <a:rPr lang="en-US" dirty="0" smtClean="0"/>
               <a:t> </a:t>
             </a:r>
+            <a:endParaRPr lang="en-US" dirty="0" smtClean="0"/>
+          </a:p>
+          <a:p>
             <a:r>
               <a:rPr lang="en-US" dirty="0" smtClean="0"/>
-              <a:t>(ignoring SMT question</a:t>
+              <a:t>Programming </a:t>
             </a:r>
             <a:r>
               <a:rPr lang="en-US" dirty="0" smtClean="0"/>
-              <a:t>)</a:t>
-            </a:r>
-            <a:r>
-              <a:rPr lang="en-US" dirty="0"/>
-              <a:t>?</a:t>
-            </a:r>
-            <a:r>
-              <a:rPr lang="en-US" dirty="0" smtClean="0"/>
-              <a:t> For example defining </a:t>
-            </a:r>
-            <a:r>
-              <a:rPr lang="en-US" dirty="0" err="1" smtClean="0"/>
-              <a:t>SysML</a:t>
-            </a:r>
-            <a:r>
-              <a:rPr lang="en-US" dirty="0" smtClean="0"/>
-              <a:t> in the core .. </a:t>
-            </a:r>
-            <a:r>
-              <a:rPr lang="en-US" dirty="0"/>
-              <a:t>s</a:t>
-            </a:r>
-            <a:r>
-              <a:rPr lang="en-US" dirty="0" smtClean="0"/>
-              <a:t>tate machines, extending AST, extending syntax!?</a:t>
-            </a:r>
-            <a:endParaRPr lang="en-US" dirty="0" smtClean="0"/>
-          </a:p>
-          <a:p>
-            <a:r>
-              <a:rPr lang="en-US" dirty="0" smtClean="0"/>
-              <a:t>Systems we have not looked at seriously: </a:t>
-            </a:r>
-            <a:r>
-              <a:rPr lang="en-US" dirty="0" err="1" smtClean="0"/>
-              <a:t>Xcode</a:t>
-            </a:r>
-            <a:r>
-              <a:rPr lang="en-US" dirty="0"/>
-              <a:t>, Alf and </a:t>
-            </a:r>
-            <a:r>
-              <a:rPr lang="en-US" dirty="0" err="1" smtClean="0"/>
-              <a:t>Modelica</a:t>
-            </a:r>
-            <a:r>
-              <a:rPr lang="en-US" dirty="0" smtClean="0"/>
-              <a:t>.</a:t>
-            </a:r>
-          </a:p>
-          <a:p>
-            <a:r>
-              <a:rPr lang="en-US" dirty="0" smtClean="0"/>
-              <a:t>Scala is an option. One can define a translator from Scala to SMT. Some work has been done in this </a:t>
-            </a:r>
-            <a:r>
-              <a:rPr lang="en-US" dirty="0"/>
-              <a:t>direction already: </a:t>
-            </a:r>
-            <a:endParaRPr lang="en-US" dirty="0" smtClean="0"/>
-          </a:p>
-          <a:p>
-            <a:pPr marL="0" indent="0">
-              <a:buNone/>
-            </a:pPr>
-            <a:r>
-              <a:rPr lang="en-US" dirty="0"/>
-              <a:t> </a:t>
-            </a:r>
-            <a:r>
-              <a:rPr lang="en-US" dirty="0" smtClean="0"/>
-              <a:t>                                     https</a:t>
-            </a:r>
-            <a:r>
-              <a:rPr lang="en-US" dirty="0"/>
-              <a:t>://</a:t>
-            </a:r>
-            <a:r>
-              <a:rPr lang="en-US" dirty="0" err="1"/>
-              <a:t>leon.epfl.ch</a:t>
-            </a:r>
-            <a:endParaRPr lang="en-US" dirty="0" smtClean="0"/>
-          </a:p>
-          <a:p>
-            <a:r>
-              <a:rPr lang="en-US" dirty="0" smtClean="0"/>
-              <a:t>Programming languages do not well support meta-programming and treatment of programs as data (except LISP). But they are very mature and seem to be sufficient for programmers. </a:t>
-            </a:r>
-            <a:r>
-              <a:rPr lang="en-US" dirty="0" smtClean="0"/>
-              <a:t>It would be useful to be clear about what  is the difference between modeling and programming, if there is one.</a:t>
-            </a:r>
-            <a:endParaRPr lang="en-US" dirty="0" smtClean="0"/>
+              <a:t>languages do not well support meta-programming and treatment of programs as data (except LISP). But they are very mature and seem to be sufficient for programmers. It would be useful to be clear about what  is the difference between modeling and programming, if there is one.</a:t>
+            </a:r>
           </a:p>
           <a:p>
             <a:endParaRPr lang="en-US" dirty="0"/>
@@ -12786,6 +13013,13 @@
   <p:clrMapOvr>
     <a:masterClrMapping/>
   </p:clrMapOvr>
+  <p:timing>
+    <p:tnLst>
+      <p:par>
+        <p:cTn xmlns:p14="http://schemas.microsoft.com/office/powerpoint/2010/main" id="1" dur="indefinite" restart="never" nodeType="tmRoot"/>
+      </p:par>
+    </p:tnLst>
+  </p:timing>
 </p:sld>
 </file>
 
@@ -12825,14 +13059,30 @@
               <a:rPr lang="en-US" dirty="0" smtClean="0"/>
               <a:t>The Book </a:t>
             </a:r>
+            <a:r>
+              <a:rPr lang="en-US" dirty="0" smtClean="0"/>
+              <a:t>Model</a:t>
+            </a:r>
             <a:br>
               <a:rPr lang="en-US" dirty="0" smtClean="0"/>
             </a:br>
             <a:r>
               <a:rPr lang="en-US" dirty="0" smtClean="0"/>
-              <a:t>K Model</a:t>
-            </a:r>
-            <a:endParaRPr lang="en-US" dirty="0"/>
+              <a:t>in </a:t>
+            </a:r>
+            <a:r>
+              <a:rPr lang="en-US" dirty="0" smtClean="0">
+                <a:solidFill>
+                  <a:srgbClr val="FF0000"/>
+                </a:solidFill>
+              </a:rPr>
+              <a:t>K</a:t>
+            </a:r>
+            <a:endParaRPr lang="en-US" dirty="0">
+              <a:solidFill>
+                <a:srgbClr val="FF0000"/>
+              </a:solidFill>
+            </a:endParaRPr>
           </a:p>
         </p:txBody>
       </p:sp>
@@ -12895,8 +13145,8 @@
         </p:blipFill>
         <p:spPr>
           <a:xfrm>
-            <a:off x="1667716" y="142057"/>
-            <a:ext cx="5062093" cy="4843899"/>
+            <a:off x="2211988" y="667270"/>
+            <a:ext cx="3853309" cy="3687218"/>
           </a:xfrm>
           <a:prstGeom prst="rect">
             <a:avLst/>
@@ -12959,14 +13209,30 @@
               <a:rPr lang="en-US" dirty="0" smtClean="0"/>
               <a:t>The Book </a:t>
             </a:r>
+            <a:r>
+              <a:rPr lang="en-US" dirty="0" smtClean="0"/>
+              <a:t>Model</a:t>
+            </a:r>
             <a:br>
               <a:rPr lang="en-US" dirty="0" smtClean="0"/>
             </a:br>
             <a:r>
               <a:rPr lang="en-US" dirty="0" smtClean="0"/>
-              <a:t>Scala Model</a:t>
-            </a:r>
-            <a:endParaRPr lang="en-US" dirty="0"/>
+              <a:t>in </a:t>
+            </a:r>
+            <a:r>
+              <a:rPr lang="en-US" dirty="0">
+                <a:solidFill>
+                  <a:srgbClr val="FF0000"/>
+                </a:solidFill>
+              </a:rPr>
+              <a:t>Scala</a:t>
+            </a:r>
+            <a:endParaRPr lang="en-US" dirty="0">
+              <a:solidFill>
+                <a:srgbClr val="FF0000"/>
+              </a:solidFill>
+            </a:endParaRPr>
           </a:p>
         </p:txBody>
       </p:sp>
@@ -13029,8 +13295,8 @@
         </p:blipFill>
         <p:spPr>
           <a:xfrm>
-            <a:off x="1986832" y="0"/>
-            <a:ext cx="5048079" cy="5143500"/>
+            <a:off x="1986833" y="257831"/>
+            <a:ext cx="4489264" cy="4574122"/>
           </a:xfrm>
           <a:prstGeom prst="rect">
             <a:avLst/>
@@ -13183,14 +13449,30 @@
               <a:rPr lang="en-US" dirty="0" smtClean="0"/>
               <a:t>The Book </a:t>
             </a:r>
+            <a:r>
+              <a:rPr lang="en-US" dirty="0" smtClean="0"/>
+              <a:t>Model</a:t>
+            </a:r>
             <a:br>
               <a:rPr lang="en-US" dirty="0" smtClean="0"/>
             </a:br>
             <a:r>
               <a:rPr lang="en-US" dirty="0" smtClean="0"/>
-              <a:t>OCLInEcore Model</a:t>
-            </a:r>
-            <a:endParaRPr lang="en-US" dirty="0"/>
+              <a:t>in </a:t>
+            </a:r>
+            <a:r>
+              <a:rPr lang="en-US" dirty="0">
+                <a:solidFill>
+                  <a:srgbClr val="FF0000"/>
+                </a:solidFill>
+              </a:rPr>
+              <a:t>OCLInEcore</a:t>
+            </a:r>
+            <a:endParaRPr lang="en-US" dirty="0">
+              <a:solidFill>
+                <a:srgbClr val="FF0000"/>
+              </a:solidFill>
+            </a:endParaRPr>
           </a:p>
         </p:txBody>
       </p:sp>

</xml_diff>

<commit_message>
added a slide to language study: what modelers want to do
</commit_message>
<xml_diff>
--- a/presentations/LanguageStudy.pptx
+++ b/presentations/LanguageStudy.pptx
@@ -41,8 +41,9 @@
     <p:sldId id="283" r:id="rId35"/>
     <p:sldId id="284" r:id="rId36"/>
     <p:sldId id="285" r:id="rId37"/>
-    <p:sldId id="287" r:id="rId38"/>
-    <p:sldId id="293" r:id="rId39"/>
+    <p:sldId id="297" r:id="rId38"/>
+    <p:sldId id="287" r:id="rId39"/>
+    <p:sldId id="293" r:id="rId40"/>
   </p:sldIdLst>
   <p:sldSz cx="9144000" cy="5143500" type="screen16x9"/>
   <p:notesSz cx="6858000" cy="9144000"/>
@@ -288,11 +289,11 @@
           <c:showBubbleSize val="0"/>
         </c:dLbls>
         <c:gapWidth val="150"/>
-        <c:axId val="-2033632488"/>
-        <c:axId val="2145457992"/>
+        <c:axId val="2143664264"/>
+        <c:axId val="-2135481656"/>
       </c:barChart>
       <c:catAx>
-        <c:axId val="-2033632488"/>
+        <c:axId val="2143664264"/>
         <c:scaling>
           <c:orientation val="minMax"/>
         </c:scaling>
@@ -301,7 +302,7 @@
         <c:majorTickMark val="out"/>
         <c:minorTickMark val="none"/>
         <c:tickLblPos val="nextTo"/>
-        <c:crossAx val="2145457992"/>
+        <c:crossAx val="-2135481656"/>
         <c:crosses val="autoZero"/>
         <c:auto val="1"/>
         <c:lblAlgn val="ctr"/>
@@ -309,7 +310,7 @@
         <c:noMultiLvlLbl val="0"/>
       </c:catAx>
       <c:valAx>
-        <c:axId val="2145457992"/>
+        <c:axId val="-2135481656"/>
         <c:scaling>
           <c:orientation val="minMax"/>
         </c:scaling>
@@ -320,7 +321,7 @@
         <c:majorTickMark val="out"/>
         <c:minorTickMark val="none"/>
         <c:tickLblPos val="nextTo"/>
-        <c:crossAx val="-2033632488"/>
+        <c:crossAx val="2143664264"/>
         <c:crosses val="autoZero"/>
         <c:crossBetween val="between"/>
       </c:valAx>
@@ -6724,27 +6725,8 @@
                   </a:schemeClr>
                 </a:solidFill>
               </a:rPr>
-              <a:t> </a:t>
-            </a:r>
-            <a:r>
-              <a:rPr lang="en-US" dirty="0" smtClean="0">
-                <a:solidFill>
-                  <a:schemeClr val="accent4">
-                    <a:lumMod val="60000"/>
-                    <a:lumOff val="40000"/>
-                  </a:schemeClr>
-                </a:solidFill>
-              </a:rPr>
-              <a:t>structure visitor</a:t>
-            </a:r>
-            <a:endParaRPr lang="en-US" dirty="0" smtClean="0">
-              <a:solidFill>
-                <a:schemeClr val="accent4">
-                  <a:lumMod val="60000"/>
-                  <a:lumOff val="40000"/>
-                </a:schemeClr>
-              </a:solidFill>
-            </a:endParaRPr>
+              <a:t> structure visitor</a:t>
+            </a:r>
           </a:p>
           <a:p>
             <a:pPr marL="285750" indent="-285750">
@@ -7164,17 +7146,8 @@
           <a:p>
             <a:r>
               <a:rPr lang="en-US" dirty="0" smtClean="0"/>
-              <a:t>Compare the </a:t>
-            </a:r>
-            <a:r>
-              <a:rPr lang="en-US" dirty="0" smtClean="0"/>
-              <a:t>following </a:t>
-            </a:r>
-            <a:r>
-              <a:rPr lang="en-US" dirty="0" smtClean="0"/>
-              <a:t>textual languages:</a:t>
-            </a:r>
-            <a:endParaRPr lang="en-US" dirty="0" smtClean="0"/>
+              <a:t>Compare the following textual languages:</a:t>
+            </a:r>
           </a:p>
           <a:p>
             <a:pPr lvl="1"/>
@@ -7363,11 +7336,7 @@
             </a:r>
             <a:r>
               <a:rPr lang="en-US" dirty="0" smtClean="0"/>
-              <a:t> flagged as </a:t>
-            </a:r>
-            <a:r>
-              <a:rPr lang="en-US" dirty="0" smtClean="0"/>
-              <a:t>such </a:t>
+              <a:t> flagged as such </a:t>
             </a:r>
             <a:endParaRPr lang="en-US" dirty="0"/>
           </a:p>
@@ -7642,11 +7611,7 @@
             </a:r>
             <a:r>
               <a:rPr lang="en-US" dirty="0" smtClean="0"/>
-              <a:t>lass Author</a:t>
-            </a:r>
-            <a:r>
-              <a:rPr lang="en-US" dirty="0" smtClean="0"/>
-              <a:t>.</a:t>
+              <a:t>lass Author.</a:t>
             </a:r>
           </a:p>
           <a:p>
@@ -9231,11 +9196,7 @@
             </a:r>
             <a:r>
               <a:rPr lang="en-US" dirty="0" smtClean="0"/>
-              <a:t>dited </a:t>
-            </a:r>
-            <a:r>
-              <a:rPr lang="en-US" dirty="0" smtClean="0"/>
-              <a:t>to use same spacing, names and use same keyword for</a:t>
+              <a:t>dited to use same spacing, names and use same keyword for</a:t>
             </a:r>
           </a:p>
           <a:p>
@@ -9422,30 +9383,14 @@
           <a:p>
             <a:r>
               <a:rPr lang="en-US" dirty="0" smtClean="0"/>
-              <a:t>The Book </a:t>
-            </a:r>
+              <a:t>The Book example (two simple classes)</a:t>
+            </a:r>
+          </a:p>
+          <a:p>
+            <a:pPr lvl="1"/>
             <a:r>
               <a:rPr lang="en-US" dirty="0" smtClean="0"/>
-              <a:t>example </a:t>
-            </a:r>
-            <a:r>
-              <a:rPr lang="en-US" dirty="0" smtClean="0"/>
-              <a:t>(two simple classes)</a:t>
-            </a:r>
-          </a:p>
-          <a:p>
-            <a:pPr lvl="1"/>
-            <a:r>
-              <a:rPr lang="en-US" dirty="0" smtClean="0"/>
-              <a:t>Formulated in K, </a:t>
-            </a:r>
-            <a:r>
-              <a:rPr lang="en-US" dirty="0" smtClean="0"/>
-              <a:t>OCLInEcore, </a:t>
-            </a:r>
-            <a:r>
-              <a:rPr lang="en-US" dirty="0" smtClean="0"/>
-              <a:t>and Scala</a:t>
+              <a:t>Formulated in K, OCLInEcore, and Scala</a:t>
             </a:r>
           </a:p>
           <a:p>
@@ -9476,40 +9421,20 @@
           <a:p>
             <a:r>
               <a:rPr lang="en-US" dirty="0" smtClean="0"/>
-              <a:t>The </a:t>
-            </a:r>
+              <a:t>The Shapes example</a:t>
+            </a:r>
+          </a:p>
+          <a:p>
+            <a:pPr lvl="1"/>
             <a:r>
               <a:rPr lang="en-US" dirty="0" smtClean="0"/>
-              <a:t>Shapes example</a:t>
-            </a:r>
-          </a:p>
-          <a:p>
-            <a:pPr lvl="1"/>
+              <a:t>Formulated in K, OCLInEcore, Scala, and Java</a:t>
+            </a:r>
+          </a:p>
+          <a:p>
             <a:r>
               <a:rPr lang="en-US" dirty="0" smtClean="0"/>
-              <a:t>Formulated in K, OCLInEcore, </a:t>
-            </a:r>
-            <a:r>
-              <a:rPr lang="en-US" dirty="0" smtClean="0"/>
-              <a:t>Scala, </a:t>
-            </a:r>
-            <a:r>
-              <a:rPr lang="en-US" dirty="0" smtClean="0"/>
-              <a:t>and Java</a:t>
-            </a:r>
-          </a:p>
-          <a:p>
-            <a:r>
-              <a:rPr lang="en-US" dirty="0" smtClean="0"/>
-              <a:t>OCL </a:t>
-            </a:r>
-            <a:r>
-              <a:rPr lang="en-US" dirty="0" smtClean="0"/>
-              <a:t>versus </a:t>
-            </a:r>
-            <a:r>
-              <a:rPr lang="en-US" dirty="0" smtClean="0"/>
-              <a:t>predicate </a:t>
+              <a:t>OCL versus predicate </a:t>
             </a:r>
             <a:r>
               <a:rPr lang="en-US" dirty="0"/>
@@ -9519,20 +9444,11 @@
               <a:rPr lang="en-US" dirty="0" smtClean="0"/>
               <a:t>ogic</a:t>
             </a:r>
-            <a:endParaRPr lang="en-US" dirty="0" smtClean="0"/>
           </a:p>
           <a:p>
             <a:r>
               <a:rPr lang="en-US" dirty="0" smtClean="0"/>
-              <a:t>Feature </a:t>
-            </a:r>
-            <a:r>
-              <a:rPr lang="en-US" dirty="0" smtClean="0"/>
-              <a:t>comparison </a:t>
-            </a:r>
-            <a:r>
-              <a:rPr lang="en-US" dirty="0" smtClean="0"/>
-              <a:t>of languages</a:t>
+              <a:t>Feature comparison of languages</a:t>
             </a:r>
           </a:p>
           <a:p>
@@ -9540,7 +9456,6 @@
               <a:rPr lang="en-US" dirty="0" smtClean="0"/>
               <a:t>Conclusions</a:t>
             </a:r>
-            <a:endParaRPr lang="en-US" dirty="0" smtClean="0"/>
           </a:p>
         </p:txBody>
       </p:sp>
@@ -10775,11 +10690,7 @@
                     <a:p>
                       <a:r>
                         <a:rPr lang="en-US" dirty="0" smtClean="0"/>
-                        <a:t>Opposite </a:t>
-                      </a:r>
-                      <a:r>
-                        <a:rPr lang="en-US" dirty="0" smtClean="0"/>
-                        <a:t>properties (</a:t>
+                        <a:t>Opposite properties (</a:t>
                       </a:r>
                       <a:r>
                         <a:rPr lang="en-US" dirty="0" err="1" smtClean="0"/>
@@ -11628,11 +11539,7 @@
                     <a:p>
                       <a:r>
                         <a:rPr lang="en-US" dirty="0" smtClean="0"/>
-                        <a:t>(+</a:t>
-                      </a:r>
-                      <a:r>
-                        <a:rPr lang="en-US" dirty="0" smtClean="0"/>
-                        <a:t>) </a:t>
+                        <a:t>(+) </a:t>
                       </a:r>
                       <a:r>
                         <a:rPr lang="en-US" dirty="0" err="1" smtClean="0"/>
@@ -12329,11 +12236,7 @@
                     <a:p>
                       <a:r>
                         <a:rPr lang="en-US" dirty="0" smtClean="0"/>
-                        <a:t>(-</a:t>
-                      </a:r>
-                      <a:r>
-                        <a:rPr lang="en-US" dirty="0" smtClean="0"/>
-                        <a:t>) interfaces</a:t>
+                        <a:t>(-) interfaces</a:t>
                       </a:r>
                       <a:endParaRPr lang="en-US" dirty="0"/>
                     </a:p>
@@ -12497,15 +12400,7 @@
                             <a:srgbClr val="FF0000"/>
                           </a:solidFill>
                         </a:rPr>
-                        <a:t>?</a:t>
-                      </a:r>
-                      <a:r>
-                        <a:rPr lang="en-US" b="1" dirty="0" smtClean="0">
-                          <a:solidFill>
-                            <a:srgbClr val="FF0000"/>
-                          </a:solidFill>
-                        </a:rPr>
-                        <a:t>?</a:t>
+                        <a:t>??</a:t>
                       </a:r>
                       <a:endParaRPr lang="en-US" b="1" dirty="0">
                         <a:solidFill>
@@ -12775,7 +12670,7 @@
           <a:p>
             <a:r>
               <a:rPr lang="en-US" dirty="0" smtClean="0"/>
-              <a:t>Conclusions</a:t>
+              <a:t>Things Modelers Do</a:t>
             </a:r>
             <a:endParaRPr lang="en-US" dirty="0"/>
           </a:p>
@@ -12794,44 +12689,175 @@
         <p:spPr/>
         <p:txBody>
           <a:bodyPr>
+            <a:normAutofit lnSpcReduction="10000"/>
+          </a:bodyPr>
+          <a:lstStyle/>
+          <a:p>
+            <a:r>
+              <a:rPr lang="en-US" dirty="0" smtClean="0"/>
+              <a:t>Store models </a:t>
+            </a:r>
+            <a:r>
+              <a:rPr lang="en-US" smtClean="0"/>
+              <a:t>as disassembled </a:t>
+            </a:r>
+            <a:r>
+              <a:rPr lang="en-US" dirty="0" smtClean="0"/>
+              <a:t>data (in database)</a:t>
+            </a:r>
+          </a:p>
+          <a:p>
+            <a:r>
+              <a:rPr lang="en-US" dirty="0" smtClean="0"/>
+              <a:t>Query models in database</a:t>
+            </a:r>
+          </a:p>
+          <a:p>
+            <a:r>
+              <a:rPr lang="en-US" dirty="0" smtClean="0"/>
+              <a:t>Transforming models (models as data)</a:t>
+            </a:r>
+          </a:p>
+          <a:p>
+            <a:r>
+              <a:rPr lang="en-US" dirty="0" smtClean="0"/>
+              <a:t>Compare models (in ways more advanced than “diff”)</a:t>
+            </a:r>
+          </a:p>
+          <a:p>
+            <a:r>
+              <a:rPr lang="en-US" dirty="0" smtClean="0"/>
+              <a:t>Advanced? merge of models developed by multiple users</a:t>
+            </a:r>
+          </a:p>
+          <a:p>
+            <a:r>
+              <a:rPr lang="en-US" dirty="0" smtClean="0"/>
+              <a:t>Build/edit models with GUIs</a:t>
+            </a:r>
+          </a:p>
+          <a:p>
+            <a:endParaRPr lang="en-US" dirty="0"/>
+          </a:p>
+        </p:txBody>
+      </p:sp>
+      <p:sp>
+        <p:nvSpPr>
+          <p:cNvPr id="5" name="TextBox 4"/>
+          <p:cNvSpPr txBox="1"/>
+          <p:nvPr/>
+        </p:nvSpPr>
+        <p:spPr>
+          <a:xfrm>
+            <a:off x="5959230" y="978505"/>
+            <a:ext cx="2569934" cy="369332"/>
+          </a:xfrm>
+          <a:prstGeom prst="rect">
+            <a:avLst/>
+          </a:prstGeom>
+          <a:noFill/>
+        </p:spPr>
+        <p:txBody>
+          <a:bodyPr wrap="none" rtlCol="0">
+            <a:spAutoFit/>
+          </a:bodyPr>
+          <a:lstStyle/>
+          <a:p>
+            <a:r>
+              <a:rPr lang="en-US" dirty="0" smtClean="0">
+                <a:solidFill>
+                  <a:srgbClr val="FFFF00"/>
+                </a:solidFill>
+              </a:rPr>
+              <a:t>That programmers don’t</a:t>
+            </a:r>
+            <a:endParaRPr lang="en-US" dirty="0">
+              <a:solidFill>
+                <a:srgbClr val="FFFF00"/>
+              </a:solidFill>
+            </a:endParaRPr>
+          </a:p>
+        </p:txBody>
+      </p:sp>
+    </p:spTree>
+    <p:extLst>
+      <p:ext uri="{BB962C8B-B14F-4D97-AF65-F5344CB8AC3E}">
+        <p14:creationId xmlns:p14="http://schemas.microsoft.com/office/powerpoint/2010/main" val="839680865"/>
+      </p:ext>
+    </p:extLst>
+  </p:cSld>
+  <p:clrMapOvr>
+    <a:masterClrMapping/>
+  </p:clrMapOvr>
+</p:sld>
+</file>
+
+<file path=ppt/slides/slide38.xml><?xml version="1.0" encoding="utf-8"?>
+<p:sld xmlns:a="http://schemas.openxmlformats.org/drawingml/2006/main" xmlns:r="http://schemas.openxmlformats.org/officeDocument/2006/relationships" xmlns:p="http://schemas.openxmlformats.org/presentationml/2006/main">
+  <p:cSld>
+    <p:spTree>
+      <p:nvGrpSpPr>
+        <p:cNvPr id="1" name=""/>
+        <p:cNvGrpSpPr/>
+        <p:nvPr/>
+      </p:nvGrpSpPr>
+      <p:grpSpPr>
+        <a:xfrm>
+          <a:off x="0" y="0"/>
+          <a:ext cx="0" cy="0"/>
+          <a:chOff x="0" y="0"/>
+          <a:chExt cx="0" cy="0"/>
+        </a:xfrm>
+      </p:grpSpPr>
+      <p:sp>
+        <p:nvSpPr>
+          <p:cNvPr id="2" name="Title 1"/>
+          <p:cNvSpPr>
+            <a:spLocks noGrp="1"/>
+          </p:cNvSpPr>
+          <p:nvPr>
+            <p:ph type="title"/>
+          </p:nvPr>
+        </p:nvSpPr>
+        <p:spPr/>
+        <p:txBody>
+          <a:bodyPr/>
+          <a:lstStyle/>
+          <a:p>
+            <a:r>
+              <a:rPr lang="en-US" dirty="0" smtClean="0"/>
+              <a:t>Conclusions</a:t>
+            </a:r>
+            <a:endParaRPr lang="en-US" dirty="0"/>
+          </a:p>
+        </p:txBody>
+      </p:sp>
+      <p:sp>
+        <p:nvSpPr>
+          <p:cNvPr id="3" name="Content Placeholder 2"/>
+          <p:cNvSpPr>
+            <a:spLocks noGrp="1"/>
+          </p:cNvSpPr>
+          <p:nvPr>
+            <p:ph idx="1"/>
+          </p:nvPr>
+        </p:nvSpPr>
+        <p:spPr/>
+        <p:txBody>
+          <a:bodyPr>
             <a:normAutofit fontScale="62500" lnSpcReduction="20000"/>
           </a:bodyPr>
           <a:lstStyle/>
           <a:p>
             <a:r>
               <a:rPr lang="en-US" dirty="0" smtClean="0"/>
-              <a:t>OCLInEcore AST is accessible and can form base for SMT translation. Experiment was successful. “Counting” in SMT </a:t>
-            </a:r>
+              <a:t>OCLInEcore AST is accessible and can form base for SMT translation. Experiment was successful. “Counting” in SMT is, however, a problem for OCLInEcore as well as for K, and other languages.</a:t>
+            </a:r>
+          </a:p>
+          <a:p>
             <a:r>
               <a:rPr lang="en-US" dirty="0" smtClean="0"/>
-              <a:t>is, however, </a:t>
-            </a:r>
-            <a:r>
-              <a:rPr lang="en-US" dirty="0" smtClean="0"/>
-              <a:t>a problem for OCLInEcore as well as for </a:t>
-            </a:r>
-            <a:r>
-              <a:rPr lang="en-US" dirty="0" smtClean="0"/>
-              <a:t>K, and </a:t>
-            </a:r>
-            <a:r>
-              <a:rPr lang="en-US" dirty="0" smtClean="0"/>
-              <a:t>other </a:t>
-            </a:r>
-            <a:r>
-              <a:rPr lang="en-US" dirty="0" smtClean="0"/>
-              <a:t>languages.</a:t>
-            </a:r>
-            <a:endParaRPr lang="en-US" dirty="0" smtClean="0"/>
-          </a:p>
-          <a:p>
-            <a:r>
-              <a:rPr lang="en-US" dirty="0" smtClean="0"/>
-              <a:t>Recommendation: Try </a:t>
-            </a:r>
-            <a:r>
-              <a:rPr lang="en-US" dirty="0" smtClean="0"/>
-              <a:t>out OCLInEcore for defining </a:t>
+              <a:t>Recommendation: Try out OCLInEcore for defining </a:t>
             </a:r>
             <a:r>
               <a:rPr lang="en-US" dirty="0" err="1" smtClean="0"/>
@@ -12847,19 +12873,7 @@
             </a:r>
             <a:r>
               <a:rPr lang="en-US" dirty="0" smtClean="0"/>
-              <a:t> </a:t>
-            </a:r>
-            <a:r>
-              <a:rPr lang="en-US" dirty="0" smtClean="0"/>
-              <a:t>Experiment with extending AST and </a:t>
-            </a:r>
-            <a:r>
-              <a:rPr lang="en-US" dirty="0" smtClean="0"/>
-              <a:t>extending </a:t>
-            </a:r>
-            <a:r>
-              <a:rPr lang="en-US" dirty="0" smtClean="0"/>
-              <a:t>syntax</a:t>
+              <a:t> Experiment with extending AST and extending syntax</a:t>
             </a:r>
             <a:r>
               <a:rPr lang="en-US" dirty="0"/>
@@ -12896,11 +12910,7 @@
             </a:r>
             <a:r>
               <a:rPr lang="en-US" dirty="0"/>
-              <a:t>direction already</a:t>
-            </a:r>
-            <a:r>
-              <a:rPr lang="en-US" dirty="0"/>
-              <a:t>: </a:t>
+              <a:t>direction already: </a:t>
             </a:r>
             <a:r>
               <a:rPr lang="en-US" dirty="0">
@@ -12926,16 +12936,11 @@
               <a:rPr lang="en-US" dirty="0" smtClean="0"/>
               <a:t> </a:t>
             </a:r>
-            <a:endParaRPr lang="en-US" dirty="0" smtClean="0"/>
           </a:p>
           <a:p>
             <a:r>
               <a:rPr lang="en-US" dirty="0" smtClean="0"/>
-              <a:t>Programming </a:t>
-            </a:r>
-            <a:r>
-              <a:rPr lang="en-US" dirty="0" smtClean="0"/>
-              <a:t>languages do not well support meta-programming and treatment of programs as data (except LISP). But they are very mature and seem to be sufficient for programmers. It would be useful to be clear about what  is the difference between modeling and programming, if there is one.</a:t>
+              <a:t>Programming languages do not well support meta-programming and treatment of programs as data (except LISP). But they are very mature and seem to be sufficient for programmers. It would be useful to be clear about what  is the difference between modeling and programming, if there is one.</a:t>
             </a:r>
           </a:p>
           <a:p>
@@ -12963,7 +12968,7 @@
 </p:sld>
 </file>
 
-<file path=ppt/slides/slide38.xml><?xml version="1.0" encoding="utf-8"?>
+<file path=ppt/slides/slide39.xml><?xml version="1.0" encoding="utf-8"?>
 <p:sld xmlns:a="http://schemas.openxmlformats.org/drawingml/2006/main" xmlns:r="http://schemas.openxmlformats.org/officeDocument/2006/relationships" xmlns:p="http://schemas.openxmlformats.org/presentationml/2006/main">
   <p:cSld>
     <p:spTree>
@@ -13057,11 +13062,7 @@
           <a:p>
             <a:r>
               <a:rPr lang="en-US" dirty="0" smtClean="0"/>
-              <a:t>The Book </a:t>
-            </a:r>
-            <a:r>
-              <a:rPr lang="en-US" dirty="0" smtClean="0"/>
-              <a:t>Model</a:t>
+              <a:t>The Book Model</a:t>
             </a:r>
             <a:br>
               <a:rPr lang="en-US" dirty="0" smtClean="0"/>
@@ -13207,11 +13208,7 @@
           <a:p>
             <a:r>
               <a:rPr lang="en-US" dirty="0" smtClean="0"/>
-              <a:t>The Book </a:t>
-            </a:r>
-            <a:r>
-              <a:rPr lang="en-US" dirty="0" smtClean="0"/>
-              <a:t>Model</a:t>
+              <a:t>The Book Model</a:t>
             </a:r>
             <a:br>
               <a:rPr lang="en-US" dirty="0" smtClean="0"/>
@@ -13228,11 +13225,6 @@
               </a:rPr>
               <a:t>Scala</a:t>
             </a:r>
-            <a:endParaRPr lang="en-US" dirty="0">
-              <a:solidFill>
-                <a:srgbClr val="FF0000"/>
-              </a:solidFill>
-            </a:endParaRPr>
           </a:p>
         </p:txBody>
       </p:sp>
@@ -13447,11 +13439,7 @@
           <a:p>
             <a:r>
               <a:rPr lang="en-US" dirty="0" smtClean="0"/>
-              <a:t>The Book </a:t>
-            </a:r>
-            <a:r>
-              <a:rPr lang="en-US" dirty="0" smtClean="0"/>
-              <a:t>Model</a:t>
+              <a:t>The Book Model</a:t>
             </a:r>
             <a:br>
               <a:rPr lang="en-US" dirty="0" smtClean="0"/>
@@ -13468,11 +13456,6 @@
               </a:rPr>
               <a:t>OCLInEcore</a:t>
             </a:r>
-            <a:endParaRPr lang="en-US" dirty="0">
-              <a:solidFill>
-                <a:srgbClr val="FF0000"/>
-              </a:solidFill>
-            </a:endParaRPr>
           </a:p>
         </p:txBody>
       </p:sp>

</xml_diff>